<commit_message>
Modification de la presetation power point
</commit_message>
<xml_diff>
--- a/presentation/Nouveau Présentation Microsoft PowerPoint.pptx
+++ b/presentation/Nouveau Présentation Microsoft PowerPoint.pptx
@@ -117,6 +117,10 @@
     </p:ext>
   </p:extLst>
 </p:presentation>
+</file>
+
+<file path=ppt/revisionInfo.xml><?xml version="1.0" encoding="utf-8"?>
+<p1510:revInfo xmlns:a="http://schemas.openxmlformats.org/drawingml/2006/main" xmlns:r="http://schemas.openxmlformats.org/officeDocument/2006/relationships" xmlns:p1510="http://schemas.microsoft.com/office/powerpoint/2015/10/main"/>
 </file>
 
 <file path=ppt/diagrams/colors1.xml><?xml version="1.0" encoding="utf-8"?>
@@ -888,18 +892,13 @@
         <a:lstStyle/>
         <a:p>
           <a:r>
-            <a:rPr lang="en-GB" noProof="0" dirty="0" smtClean="0">
+            <a:rPr lang="en-GB" noProof="0" dirty="0">
               <a:solidFill>
                 <a:schemeClr val="tx1"/>
               </a:solidFill>
             </a:rPr>
             <a:t>Generate the data</a:t>
           </a:r>
-          <a:endParaRPr lang="en-GB" noProof="0" dirty="0" smtClean="0">
-            <a:solidFill>
-              <a:schemeClr val="tx1"/>
-            </a:solidFill>
-          </a:endParaRPr>
         </a:p>
       </dgm:t>
     </dgm:pt>
@@ -940,18 +939,13 @@
         <a:lstStyle/>
         <a:p>
           <a:r>
-            <a:rPr lang="en-GB" noProof="0" dirty="0" smtClean="0">
+            <a:rPr lang="en-GB" noProof="0" dirty="0">
               <a:solidFill>
                 <a:schemeClr val="tx1"/>
               </a:solidFill>
             </a:rPr>
             <a:t>Simplification</a:t>
           </a:r>
-          <a:endParaRPr lang="en-GB" noProof="0" dirty="0">
-            <a:solidFill>
-              <a:schemeClr val="tx1"/>
-            </a:solidFill>
-          </a:endParaRPr>
         </a:p>
       </dgm:t>
     </dgm:pt>
@@ -993,13 +987,6 @@
         </dgm:presLayoutVars>
       </dgm:prSet>
       <dgm:spPr/>
-      <dgm:t>
-        <a:bodyPr/>
-        <a:lstStyle/>
-        <a:p>
-          <a:endParaRPr lang="fr-FR"/>
-        </a:p>
-      </dgm:t>
     </dgm:pt>
     <dgm:pt modelId="{BA5AE161-8D48-4F65-AB73-95938185A509}" type="pres">
       <dgm:prSet presAssocID="{D5DD555F-B98C-4985-94BD-68D3D914707E}" presName="parSpace" presStyleCnt="0"/>
@@ -1012,21 +999,14 @@
         </dgm:presLayoutVars>
       </dgm:prSet>
       <dgm:spPr/>
-      <dgm:t>
-        <a:bodyPr/>
-        <a:lstStyle/>
-        <a:p>
-          <a:endParaRPr lang="fr-FR"/>
-        </a:p>
-      </dgm:t>
     </dgm:pt>
   </dgm:ptLst>
   <dgm:cxnLst>
+    <dgm:cxn modelId="{E7B0AA08-3539-4622-BFCA-05CA5E18A2D1}" srcId="{C26CEB7B-6371-48F5-8DF9-7DB41DD6E4FC}" destId="{5D170049-A05B-4112-B847-1E04E205E515}" srcOrd="0" destOrd="0" parTransId="{B4B83E67-9C67-49B2-8458-199039D75850}" sibTransId="{D5DD555F-B98C-4985-94BD-68D3D914707E}"/>
+    <dgm:cxn modelId="{B77C0725-EA14-4A65-A5C8-A8B63FF789AF}" srcId="{C26CEB7B-6371-48F5-8DF9-7DB41DD6E4FC}" destId="{FDF5373B-D053-4DFC-BA18-3914C6B86C2D}" srcOrd="1" destOrd="0" parTransId="{EDDB7CCE-DD89-41DC-A532-18C3CF4611E8}" sibTransId="{EBAD38B5-CCBC-46EB-97ED-1F4F92FD50BD}"/>
     <dgm:cxn modelId="{D86D2DD4-CE12-4D4F-AE64-9799E1546340}" type="presOf" srcId="{C26CEB7B-6371-48F5-8DF9-7DB41DD6E4FC}" destId="{85269777-D6B3-4FB4-9EA1-EE229885C71B}" srcOrd="0" destOrd="0" presId="urn:microsoft.com/office/officeart/2005/8/layout/hChevron3"/>
     <dgm:cxn modelId="{1B46A9F3-CE60-475C-A2F7-518682DC2A99}" type="presOf" srcId="{5D170049-A05B-4112-B847-1E04E205E515}" destId="{531DD117-6A4A-427C-8A80-880741809980}" srcOrd="0" destOrd="0" presId="urn:microsoft.com/office/officeart/2005/8/layout/hChevron3"/>
-    <dgm:cxn modelId="{E7B0AA08-3539-4622-BFCA-05CA5E18A2D1}" srcId="{C26CEB7B-6371-48F5-8DF9-7DB41DD6E4FC}" destId="{5D170049-A05B-4112-B847-1E04E205E515}" srcOrd="0" destOrd="0" parTransId="{B4B83E67-9C67-49B2-8458-199039D75850}" sibTransId="{D5DD555F-B98C-4985-94BD-68D3D914707E}"/>
     <dgm:cxn modelId="{B2AD1DFD-DF1C-4A81-AEE8-B9A38DA30E3F}" type="presOf" srcId="{FDF5373B-D053-4DFC-BA18-3914C6B86C2D}" destId="{AEEFD6F8-1893-4E1B-B938-24EEF848E496}" srcOrd="0" destOrd="0" presId="urn:microsoft.com/office/officeart/2005/8/layout/hChevron3"/>
-    <dgm:cxn modelId="{B77C0725-EA14-4A65-A5C8-A8B63FF789AF}" srcId="{C26CEB7B-6371-48F5-8DF9-7DB41DD6E4FC}" destId="{FDF5373B-D053-4DFC-BA18-3914C6B86C2D}" srcOrd="1" destOrd="0" parTransId="{EDDB7CCE-DD89-41DC-A532-18C3CF4611E8}" sibTransId="{EBAD38B5-CCBC-46EB-97ED-1F4F92FD50BD}"/>
     <dgm:cxn modelId="{354EF07B-CFFC-4B9E-BD40-62F17F5BEA64}" type="presParOf" srcId="{85269777-D6B3-4FB4-9EA1-EE229885C71B}" destId="{531DD117-6A4A-427C-8A80-880741809980}" srcOrd="0" destOrd="0" presId="urn:microsoft.com/office/officeart/2005/8/layout/hChevron3"/>
     <dgm:cxn modelId="{85AB4060-E7D9-498C-A4A2-B96DD046427D}" type="presParOf" srcId="{85269777-D6B3-4FB4-9EA1-EE229885C71B}" destId="{BA5AE161-8D48-4F65-AB73-95938185A509}" srcOrd="1" destOrd="0" presId="urn:microsoft.com/office/officeart/2005/8/layout/hChevron3"/>
     <dgm:cxn modelId="{B700520E-9E3B-4CBB-8AD0-958C3894197D}" type="presParOf" srcId="{85269777-D6B3-4FB4-9EA1-EE229885C71B}" destId="{AEEFD6F8-1893-4E1B-B938-24EEF848E496}" srcOrd="2" destOrd="0" presId="urn:microsoft.com/office/officeart/2005/8/layout/hChevron3"/>
@@ -1102,7 +1082,7 @@
         </a:bodyPr>
         <a:lstStyle/>
         <a:p>
-          <a:pPr lvl="0" algn="ctr" defTabSz="933450">
+          <a:pPr marL="0" lvl="0" indent="0" algn="ctr" defTabSz="933450">
             <a:lnSpc>
               <a:spcPct val="90000"/>
             </a:lnSpc>
@@ -1112,20 +1092,16 @@
             <a:spcAft>
               <a:spcPct val="35000"/>
             </a:spcAft>
+            <a:buNone/>
           </a:pPr>
           <a:r>
-            <a:rPr lang="en-GB" sz="2100" kern="1200" noProof="0" dirty="0" smtClean="0">
+            <a:rPr lang="en-GB" sz="2100" kern="1200" noProof="0" dirty="0">
               <a:solidFill>
                 <a:schemeClr val="tx1"/>
               </a:solidFill>
             </a:rPr>
             <a:t>Generate the data</a:t>
           </a:r>
-          <a:endParaRPr lang="en-GB" sz="2100" kern="1200" noProof="0" dirty="0" smtClean="0">
-            <a:solidFill>
-              <a:schemeClr val="tx1"/>
-            </a:solidFill>
-          </a:endParaRPr>
         </a:p>
       </dsp:txBody>
       <dsp:txXfrm>
@@ -1186,7 +1162,7 @@
         </a:bodyPr>
         <a:lstStyle/>
         <a:p>
-          <a:pPr lvl="0" algn="ctr" defTabSz="933450">
+          <a:pPr marL="0" lvl="0" indent="0" algn="ctr" defTabSz="933450">
             <a:lnSpc>
               <a:spcPct val="90000"/>
             </a:lnSpc>
@@ -1196,20 +1172,16 @@
             <a:spcAft>
               <a:spcPct val="35000"/>
             </a:spcAft>
+            <a:buNone/>
           </a:pPr>
           <a:r>
-            <a:rPr lang="en-GB" sz="2100" kern="1200" noProof="0" dirty="0" smtClean="0">
+            <a:rPr lang="en-GB" sz="2100" kern="1200" noProof="0" dirty="0">
               <a:solidFill>
                 <a:schemeClr val="tx1"/>
               </a:solidFill>
             </a:rPr>
             <a:t>Simplification</a:t>
           </a:r>
-          <a:endParaRPr lang="en-GB" sz="2100" kern="1200" noProof="0" dirty="0">
-            <a:solidFill>
-              <a:schemeClr val="tx1"/>
-            </a:solidFill>
-          </a:endParaRPr>
         </a:p>
       </dsp:txBody>
       <dsp:txXfrm>
@@ -2571,7 +2543,7 @@
           </a:lstStyle>
           <a:p>
             <a:r>
-              <a:rPr lang="fr-FR" smtClean="0"/>
+              <a:rPr lang="fr-FR"/>
               <a:t>Modifiez le style du titre</a:t>
             </a:r>
             <a:endParaRPr lang="en-US" dirty="0"/>
@@ -2645,7 +2617,7 @@
           </a:lstStyle>
           <a:p>
             <a:r>
-              <a:rPr lang="fr-FR" smtClean="0"/>
+              <a:rPr lang="fr-FR"/>
               <a:t>Modifier le style des sous-titres du masque</a:t>
             </a:r>
             <a:endParaRPr lang="en-US" dirty="0"/>
@@ -2763,7 +2735,7 @@
           <a:lstStyle/>
           <a:p>
             <a:r>
-              <a:rPr lang="fr-FR" smtClean="0"/>
+              <a:rPr lang="fr-FR"/>
               <a:t>Modifiez le style du titre</a:t>
             </a:r>
             <a:endParaRPr lang="en-US"/>
@@ -2787,35 +2759,35 @@
           <a:p>
             <a:pPr lvl="0"/>
             <a:r>
-              <a:rPr lang="fr-FR" smtClean="0"/>
+              <a:rPr lang="fr-FR"/>
               <a:t>Modifier les styles du texte du masque</a:t>
             </a:r>
           </a:p>
           <a:p>
             <a:pPr lvl="1"/>
             <a:r>
-              <a:rPr lang="fr-FR" smtClean="0"/>
+              <a:rPr lang="fr-FR"/>
               <a:t>Deuxième niveau</a:t>
             </a:r>
           </a:p>
           <a:p>
             <a:pPr lvl="2"/>
             <a:r>
-              <a:rPr lang="fr-FR" smtClean="0"/>
+              <a:rPr lang="fr-FR"/>
               <a:t>Troisième niveau</a:t>
             </a:r>
           </a:p>
           <a:p>
             <a:pPr lvl="3"/>
             <a:r>
-              <a:rPr lang="fr-FR" smtClean="0"/>
+              <a:rPr lang="fr-FR"/>
               <a:t>Quatrième niveau</a:t>
             </a:r>
           </a:p>
           <a:p>
             <a:pPr lvl="4"/>
             <a:r>
-              <a:rPr lang="fr-FR" smtClean="0"/>
+              <a:rPr lang="fr-FR"/>
               <a:t>Cinquième niveau</a:t>
             </a:r>
             <a:endParaRPr lang="en-US" dirty="0"/>
@@ -2938,7 +2910,7 @@
           <a:lstStyle/>
           <a:p>
             <a:r>
-              <a:rPr lang="fr-FR" smtClean="0"/>
+              <a:rPr lang="fr-FR"/>
               <a:t>Modifiez le style du titre</a:t>
             </a:r>
             <a:endParaRPr lang="en-US"/>
@@ -2967,35 +2939,35 @@
           <a:p>
             <a:pPr lvl="0"/>
             <a:r>
-              <a:rPr lang="fr-FR" smtClean="0"/>
+              <a:rPr lang="fr-FR"/>
               <a:t>Modifier les styles du texte du masque</a:t>
             </a:r>
           </a:p>
           <a:p>
             <a:pPr lvl="1"/>
             <a:r>
-              <a:rPr lang="fr-FR" smtClean="0"/>
+              <a:rPr lang="fr-FR"/>
               <a:t>Deuxième niveau</a:t>
             </a:r>
           </a:p>
           <a:p>
             <a:pPr lvl="2"/>
             <a:r>
-              <a:rPr lang="fr-FR" smtClean="0"/>
+              <a:rPr lang="fr-FR"/>
               <a:t>Troisième niveau</a:t>
             </a:r>
           </a:p>
           <a:p>
             <a:pPr lvl="3"/>
             <a:r>
-              <a:rPr lang="fr-FR" smtClean="0"/>
+              <a:rPr lang="fr-FR"/>
               <a:t>Quatrième niveau</a:t>
             </a:r>
           </a:p>
           <a:p>
             <a:pPr lvl="4"/>
             <a:r>
-              <a:rPr lang="fr-FR" smtClean="0"/>
+              <a:rPr lang="fr-FR"/>
               <a:t>Cinquième niveau</a:t>
             </a:r>
             <a:endParaRPr lang="en-US"/>
@@ -3124,7 +3096,7 @@
           </a:lstStyle>
           <a:p>
             <a:r>
-              <a:rPr lang="fr-FR" smtClean="0"/>
+              <a:rPr lang="fr-FR"/>
               <a:t>Modifiez le style du titre</a:t>
             </a:r>
             <a:endParaRPr lang="en-US" dirty="0"/>
@@ -3198,7 +3170,7 @@
           </a:lstStyle>
           <a:p>
             <a:r>
-              <a:rPr lang="fr-FR" smtClean="0"/>
+              <a:rPr lang="fr-FR"/>
               <a:t>Modifier le style des sous-titres du masque</a:t>
             </a:r>
             <a:endParaRPr lang="en-US" dirty="0"/>
@@ -3316,7 +3288,7 @@
           <a:lstStyle/>
           <a:p>
             <a:r>
-              <a:rPr lang="fr-FR" smtClean="0"/>
+              <a:rPr lang="fr-FR"/>
               <a:t>Modifiez le style du titre</a:t>
             </a:r>
             <a:endParaRPr lang="en-US" dirty="0"/>
@@ -3340,35 +3312,35 @@
           <a:p>
             <a:pPr lvl="0"/>
             <a:r>
-              <a:rPr lang="fr-FR" smtClean="0"/>
+              <a:rPr lang="fr-FR"/>
               <a:t>Modifier les styles du texte du masque</a:t>
             </a:r>
           </a:p>
           <a:p>
             <a:pPr lvl="1"/>
             <a:r>
-              <a:rPr lang="fr-FR" smtClean="0"/>
+              <a:rPr lang="fr-FR"/>
               <a:t>Deuxième niveau</a:t>
             </a:r>
           </a:p>
           <a:p>
             <a:pPr lvl="2"/>
             <a:r>
-              <a:rPr lang="fr-FR" smtClean="0"/>
+              <a:rPr lang="fr-FR"/>
               <a:t>Troisième niveau</a:t>
             </a:r>
           </a:p>
           <a:p>
             <a:pPr lvl="3"/>
             <a:r>
-              <a:rPr lang="fr-FR" smtClean="0"/>
+              <a:rPr lang="fr-FR"/>
               <a:t>Quatrième niveau</a:t>
             </a:r>
           </a:p>
           <a:p>
             <a:pPr lvl="4"/>
             <a:r>
-              <a:rPr lang="fr-FR" smtClean="0"/>
+              <a:rPr lang="fr-FR"/>
               <a:t>Cinquième niveau</a:t>
             </a:r>
             <a:endParaRPr lang="en-US" dirty="0"/>
@@ -3497,7 +3469,7 @@
           </a:lstStyle>
           <a:p>
             <a:r>
-              <a:rPr lang="fr-FR" smtClean="0"/>
+              <a:rPr lang="fr-FR"/>
               <a:t>Modifiez le style du titre</a:t>
             </a:r>
             <a:endParaRPr lang="en-US" dirty="0"/>
@@ -3620,7 +3592,7 @@
           <a:p>
             <a:pPr lvl="0"/>
             <a:r>
-              <a:rPr lang="fr-FR" smtClean="0"/>
+              <a:rPr lang="fr-FR"/>
               <a:t>Modifier les styles du texte du masque</a:t>
             </a:r>
           </a:p>
@@ -3737,7 +3709,7 @@
           <a:lstStyle/>
           <a:p>
             <a:r>
-              <a:rPr lang="fr-FR" smtClean="0"/>
+              <a:rPr lang="fr-FR"/>
               <a:t>Modifiez le style du titre</a:t>
             </a:r>
             <a:endParaRPr lang="en-US" dirty="0"/>
@@ -3766,35 +3738,35 @@
           <a:p>
             <a:pPr lvl="0"/>
             <a:r>
-              <a:rPr lang="fr-FR" smtClean="0"/>
+              <a:rPr lang="fr-FR"/>
               <a:t>Modifier les styles du texte du masque</a:t>
             </a:r>
           </a:p>
           <a:p>
             <a:pPr lvl="1"/>
             <a:r>
-              <a:rPr lang="fr-FR" smtClean="0"/>
+              <a:rPr lang="fr-FR"/>
               <a:t>Deuxième niveau</a:t>
             </a:r>
           </a:p>
           <a:p>
             <a:pPr lvl="2"/>
             <a:r>
-              <a:rPr lang="fr-FR" smtClean="0"/>
+              <a:rPr lang="fr-FR"/>
               <a:t>Troisième niveau</a:t>
             </a:r>
           </a:p>
           <a:p>
             <a:pPr lvl="3"/>
             <a:r>
-              <a:rPr lang="fr-FR" smtClean="0"/>
+              <a:rPr lang="fr-FR"/>
               <a:t>Quatrième niveau</a:t>
             </a:r>
           </a:p>
           <a:p>
             <a:pPr lvl="4"/>
             <a:r>
-              <a:rPr lang="fr-FR" smtClean="0"/>
+              <a:rPr lang="fr-FR"/>
               <a:t>Cinquième niveau</a:t>
             </a:r>
             <a:endParaRPr lang="en-US" dirty="0"/>
@@ -3823,35 +3795,35 @@
           <a:p>
             <a:pPr lvl="0"/>
             <a:r>
-              <a:rPr lang="fr-FR" smtClean="0"/>
+              <a:rPr lang="fr-FR"/>
               <a:t>Modifier les styles du texte du masque</a:t>
             </a:r>
           </a:p>
           <a:p>
             <a:pPr lvl="1"/>
             <a:r>
-              <a:rPr lang="fr-FR" smtClean="0"/>
+              <a:rPr lang="fr-FR"/>
               <a:t>Deuxième niveau</a:t>
             </a:r>
           </a:p>
           <a:p>
             <a:pPr lvl="2"/>
             <a:r>
-              <a:rPr lang="fr-FR" smtClean="0"/>
+              <a:rPr lang="fr-FR"/>
               <a:t>Troisième niveau</a:t>
             </a:r>
           </a:p>
           <a:p>
             <a:pPr lvl="3"/>
             <a:r>
-              <a:rPr lang="fr-FR" smtClean="0"/>
+              <a:rPr lang="fr-FR"/>
               <a:t>Quatrième niveau</a:t>
             </a:r>
           </a:p>
           <a:p>
             <a:pPr lvl="4"/>
             <a:r>
-              <a:rPr lang="fr-FR" smtClean="0"/>
+              <a:rPr lang="fr-FR"/>
               <a:t>Cinquième niveau</a:t>
             </a:r>
             <a:endParaRPr lang="en-US" dirty="0"/>
@@ -4017,7 +3989,7 @@
           <a:p>
             <a:pPr lvl="0"/>
             <a:r>
-              <a:rPr lang="fr-FR" smtClean="0"/>
+              <a:rPr lang="fr-FR"/>
               <a:t>Modifier les styles du texte du masque</a:t>
             </a:r>
           </a:p>
@@ -4045,35 +4017,35 @@
           <a:p>
             <a:pPr lvl="0"/>
             <a:r>
-              <a:rPr lang="fr-FR" smtClean="0"/>
+              <a:rPr lang="fr-FR"/>
               <a:t>Modifier les styles du texte du masque</a:t>
             </a:r>
           </a:p>
           <a:p>
             <a:pPr lvl="1"/>
             <a:r>
-              <a:rPr lang="fr-FR" smtClean="0"/>
+              <a:rPr lang="fr-FR"/>
               <a:t>Deuxième niveau</a:t>
             </a:r>
           </a:p>
           <a:p>
             <a:pPr lvl="2"/>
             <a:r>
-              <a:rPr lang="fr-FR" smtClean="0"/>
+              <a:rPr lang="fr-FR"/>
               <a:t>Troisième niveau</a:t>
             </a:r>
           </a:p>
           <a:p>
             <a:pPr lvl="3"/>
             <a:r>
-              <a:rPr lang="fr-FR" smtClean="0"/>
+              <a:rPr lang="fr-FR"/>
               <a:t>Quatrième niveau</a:t>
             </a:r>
           </a:p>
           <a:p>
             <a:pPr lvl="4"/>
             <a:r>
-              <a:rPr lang="fr-FR" smtClean="0"/>
+              <a:rPr lang="fr-FR"/>
               <a:t>Cinquième niveau</a:t>
             </a:r>
             <a:endParaRPr lang="en-US" dirty="0"/>
@@ -4142,7 +4114,7 @@
           <a:p>
             <a:pPr lvl="0"/>
             <a:r>
-              <a:rPr lang="fr-FR" smtClean="0"/>
+              <a:rPr lang="fr-FR"/>
               <a:t>Modifier les styles du texte du masque</a:t>
             </a:r>
           </a:p>
@@ -4170,35 +4142,35 @@
           <a:p>
             <a:pPr lvl="0"/>
             <a:r>
-              <a:rPr lang="fr-FR" smtClean="0"/>
+              <a:rPr lang="fr-FR"/>
               <a:t>Modifier les styles du texte du masque</a:t>
             </a:r>
           </a:p>
           <a:p>
             <a:pPr lvl="1"/>
             <a:r>
-              <a:rPr lang="fr-FR" smtClean="0"/>
+              <a:rPr lang="fr-FR"/>
               <a:t>Deuxième niveau</a:t>
             </a:r>
           </a:p>
           <a:p>
             <a:pPr lvl="2"/>
             <a:r>
-              <a:rPr lang="fr-FR" smtClean="0"/>
+              <a:rPr lang="fr-FR"/>
               <a:t>Troisième niveau</a:t>
             </a:r>
           </a:p>
           <a:p>
             <a:pPr lvl="3"/>
             <a:r>
-              <a:rPr lang="fr-FR" smtClean="0"/>
+              <a:rPr lang="fr-FR"/>
               <a:t>Quatrième niveau</a:t>
             </a:r>
           </a:p>
           <a:p>
             <a:pPr lvl="4"/>
             <a:r>
-              <a:rPr lang="fr-FR" smtClean="0"/>
+              <a:rPr lang="fr-FR"/>
               <a:t>Cinquième niveau</a:t>
             </a:r>
             <a:endParaRPr lang="en-US"/>
@@ -4286,7 +4258,7 @@
           <a:lstStyle/>
           <a:p>
             <a:r>
-              <a:rPr lang="fr-FR" smtClean="0"/>
+              <a:rPr lang="fr-FR"/>
               <a:t>Modifiez le style du titre</a:t>
             </a:r>
             <a:endParaRPr lang="en-US" dirty="0"/>
@@ -4404,7 +4376,7 @@
           <a:lstStyle/>
           <a:p>
             <a:r>
-              <a:rPr lang="fr-FR" smtClean="0"/>
+              <a:rPr lang="fr-FR"/>
               <a:t>Modifiez le style du titre</a:t>
             </a:r>
             <a:endParaRPr lang="en-US"/>
@@ -4563,7 +4535,7 @@
           </a:lstStyle>
           <a:p>
             <a:r>
-              <a:rPr lang="fr-FR" smtClean="0"/>
+              <a:rPr lang="fr-FR"/>
               <a:t>Modifiez le style du titre</a:t>
             </a:r>
             <a:endParaRPr lang="en-US" dirty="0"/>
@@ -4620,35 +4592,35 @@
           <a:p>
             <a:pPr lvl="0"/>
             <a:r>
-              <a:rPr lang="fr-FR" smtClean="0"/>
+              <a:rPr lang="fr-FR"/>
               <a:t>Modifier les styles du texte du masque</a:t>
             </a:r>
           </a:p>
           <a:p>
             <a:pPr lvl="1"/>
             <a:r>
-              <a:rPr lang="fr-FR" smtClean="0"/>
+              <a:rPr lang="fr-FR"/>
               <a:t>Deuxième niveau</a:t>
             </a:r>
           </a:p>
           <a:p>
             <a:pPr lvl="2"/>
             <a:r>
-              <a:rPr lang="fr-FR" smtClean="0"/>
+              <a:rPr lang="fr-FR"/>
               <a:t>Troisième niveau</a:t>
             </a:r>
           </a:p>
           <a:p>
             <a:pPr lvl="3"/>
             <a:r>
-              <a:rPr lang="fr-FR" smtClean="0"/>
+              <a:rPr lang="fr-FR"/>
               <a:t>Quatrième niveau</a:t>
             </a:r>
           </a:p>
           <a:p>
             <a:pPr lvl="4"/>
             <a:r>
-              <a:rPr lang="fr-FR" smtClean="0"/>
+              <a:rPr lang="fr-FR"/>
               <a:t>Cinquième niveau</a:t>
             </a:r>
             <a:endParaRPr lang="en-US" dirty="0"/>
@@ -4719,7 +4691,7 @@
           <a:p>
             <a:pPr lvl="0"/>
             <a:r>
-              <a:rPr lang="fr-FR" smtClean="0"/>
+              <a:rPr lang="fr-FR"/>
               <a:t>Modifier les styles du texte du masque</a:t>
             </a:r>
           </a:p>
@@ -4836,7 +4808,7 @@
           <a:lstStyle/>
           <a:p>
             <a:r>
-              <a:rPr lang="fr-FR" smtClean="0"/>
+              <a:rPr lang="fr-FR"/>
               <a:t>Modifiez le style du titre</a:t>
             </a:r>
             <a:endParaRPr lang="en-US" dirty="0"/>
@@ -4860,35 +4832,35 @@
           <a:p>
             <a:pPr lvl="0"/>
             <a:r>
-              <a:rPr lang="fr-FR" smtClean="0"/>
+              <a:rPr lang="fr-FR"/>
               <a:t>Modifier les styles du texte du masque</a:t>
             </a:r>
           </a:p>
           <a:p>
             <a:pPr lvl="1"/>
             <a:r>
-              <a:rPr lang="fr-FR" smtClean="0"/>
+              <a:rPr lang="fr-FR"/>
               <a:t>Deuxième niveau</a:t>
             </a:r>
           </a:p>
           <a:p>
             <a:pPr lvl="2"/>
             <a:r>
-              <a:rPr lang="fr-FR" smtClean="0"/>
+              <a:rPr lang="fr-FR"/>
               <a:t>Troisième niveau</a:t>
             </a:r>
           </a:p>
           <a:p>
             <a:pPr lvl="3"/>
             <a:r>
-              <a:rPr lang="fr-FR" smtClean="0"/>
+              <a:rPr lang="fr-FR"/>
               <a:t>Quatrième niveau</a:t>
             </a:r>
           </a:p>
           <a:p>
             <a:pPr lvl="4"/>
             <a:r>
-              <a:rPr lang="fr-FR" smtClean="0"/>
+              <a:rPr lang="fr-FR"/>
               <a:t>Cinquième niveau</a:t>
             </a:r>
             <a:endParaRPr lang="en-US" dirty="0"/>
@@ -5017,7 +4989,7 @@
           </a:lstStyle>
           <a:p>
             <a:r>
-              <a:rPr lang="fr-FR" smtClean="0"/>
+              <a:rPr lang="fr-FR"/>
               <a:t>Modifiez le style du titre</a:t>
             </a:r>
             <a:endParaRPr lang="en-US" dirty="0"/>
@@ -5082,7 +5054,7 @@
           </a:lstStyle>
           <a:p>
             <a:r>
-              <a:rPr lang="fr-FR" dirty="0" smtClean="0"/>
+              <a:rPr lang="fr-FR" dirty="0"/>
               <a:t>Cliquez sur l'icône pour ajouter une image</a:t>
             </a:r>
             <a:endParaRPr lang="en-US" dirty="0"/>
@@ -5153,7 +5125,7 @@
           <a:p>
             <a:pPr lvl="0"/>
             <a:r>
-              <a:rPr lang="fr-FR" smtClean="0"/>
+              <a:rPr lang="fr-FR"/>
               <a:t>Modifier les styles du texte du masque</a:t>
             </a:r>
           </a:p>
@@ -5270,7 +5242,7 @@
           <a:lstStyle/>
           <a:p>
             <a:r>
-              <a:rPr lang="fr-FR" smtClean="0"/>
+              <a:rPr lang="fr-FR"/>
               <a:t>Modifiez le style du titre</a:t>
             </a:r>
             <a:endParaRPr lang="en-US"/>
@@ -5294,35 +5266,35 @@
           <a:p>
             <a:pPr lvl="0"/>
             <a:r>
-              <a:rPr lang="fr-FR" smtClean="0"/>
+              <a:rPr lang="fr-FR"/>
               <a:t>Modifier les styles du texte du masque</a:t>
             </a:r>
           </a:p>
           <a:p>
             <a:pPr lvl="1"/>
             <a:r>
-              <a:rPr lang="fr-FR" smtClean="0"/>
+              <a:rPr lang="fr-FR"/>
               <a:t>Deuxième niveau</a:t>
             </a:r>
           </a:p>
           <a:p>
             <a:pPr lvl="2"/>
             <a:r>
-              <a:rPr lang="fr-FR" smtClean="0"/>
+              <a:rPr lang="fr-FR"/>
               <a:t>Troisième niveau</a:t>
             </a:r>
           </a:p>
           <a:p>
             <a:pPr lvl="3"/>
             <a:r>
-              <a:rPr lang="fr-FR" smtClean="0"/>
+              <a:rPr lang="fr-FR"/>
               <a:t>Quatrième niveau</a:t>
             </a:r>
           </a:p>
           <a:p>
             <a:pPr lvl="4"/>
             <a:r>
-              <a:rPr lang="fr-FR" smtClean="0"/>
+              <a:rPr lang="fr-FR"/>
               <a:t>Cinquième niveau</a:t>
             </a:r>
             <a:endParaRPr lang="en-US" dirty="0"/>
@@ -5445,7 +5417,7 @@
           <a:lstStyle/>
           <a:p>
             <a:r>
-              <a:rPr lang="fr-FR" smtClean="0"/>
+              <a:rPr lang="fr-FR"/>
               <a:t>Modifiez le style du titre</a:t>
             </a:r>
             <a:endParaRPr lang="en-US"/>
@@ -5474,35 +5446,35 @@
           <a:p>
             <a:pPr lvl="0"/>
             <a:r>
-              <a:rPr lang="fr-FR" smtClean="0"/>
+              <a:rPr lang="fr-FR"/>
               <a:t>Modifier les styles du texte du masque</a:t>
             </a:r>
           </a:p>
           <a:p>
             <a:pPr lvl="1"/>
             <a:r>
-              <a:rPr lang="fr-FR" smtClean="0"/>
+              <a:rPr lang="fr-FR"/>
               <a:t>Deuxième niveau</a:t>
             </a:r>
           </a:p>
           <a:p>
             <a:pPr lvl="2"/>
             <a:r>
-              <a:rPr lang="fr-FR" smtClean="0"/>
+              <a:rPr lang="fr-FR"/>
               <a:t>Troisième niveau</a:t>
             </a:r>
           </a:p>
           <a:p>
             <a:pPr lvl="3"/>
             <a:r>
-              <a:rPr lang="fr-FR" smtClean="0"/>
+              <a:rPr lang="fr-FR"/>
               <a:t>Quatrième niveau</a:t>
             </a:r>
           </a:p>
           <a:p>
             <a:pPr lvl="4"/>
             <a:r>
-              <a:rPr lang="fr-FR" smtClean="0"/>
+              <a:rPr lang="fr-FR"/>
               <a:t>Cinquième niveau</a:t>
             </a:r>
             <a:endParaRPr lang="en-US"/>
@@ -5631,7 +5603,7 @@
           </a:lstStyle>
           <a:p>
             <a:r>
-              <a:rPr lang="fr-FR" smtClean="0"/>
+              <a:rPr lang="fr-FR"/>
               <a:t>Modifiez le style du titre</a:t>
             </a:r>
             <a:endParaRPr lang="en-US" dirty="0"/>
@@ -5705,7 +5677,7 @@
           </a:lstStyle>
           <a:p>
             <a:r>
-              <a:rPr lang="fr-FR" smtClean="0"/>
+              <a:rPr lang="fr-FR"/>
               <a:t>Modifier le style des sous-titres du masque</a:t>
             </a:r>
             <a:endParaRPr lang="en-US" dirty="0"/>
@@ -5823,7 +5795,7 @@
           <a:lstStyle/>
           <a:p>
             <a:r>
-              <a:rPr lang="fr-FR" smtClean="0"/>
+              <a:rPr lang="fr-FR"/>
               <a:t>Modifiez le style du titre</a:t>
             </a:r>
             <a:endParaRPr lang="en-US" dirty="0"/>
@@ -5847,35 +5819,35 @@
           <a:p>
             <a:pPr lvl="0"/>
             <a:r>
-              <a:rPr lang="fr-FR" smtClean="0"/>
+              <a:rPr lang="fr-FR"/>
               <a:t>Modifier les styles du texte du masque</a:t>
             </a:r>
           </a:p>
           <a:p>
             <a:pPr lvl="1"/>
             <a:r>
-              <a:rPr lang="fr-FR" smtClean="0"/>
+              <a:rPr lang="fr-FR"/>
               <a:t>Deuxième niveau</a:t>
             </a:r>
           </a:p>
           <a:p>
             <a:pPr lvl="2"/>
             <a:r>
-              <a:rPr lang="fr-FR" smtClean="0"/>
+              <a:rPr lang="fr-FR"/>
               <a:t>Troisième niveau</a:t>
             </a:r>
           </a:p>
           <a:p>
             <a:pPr lvl="3"/>
             <a:r>
-              <a:rPr lang="fr-FR" smtClean="0"/>
+              <a:rPr lang="fr-FR"/>
               <a:t>Quatrième niveau</a:t>
             </a:r>
           </a:p>
           <a:p>
             <a:pPr lvl="4"/>
             <a:r>
-              <a:rPr lang="fr-FR" smtClean="0"/>
+              <a:rPr lang="fr-FR"/>
               <a:t>Cinquième niveau</a:t>
             </a:r>
             <a:endParaRPr lang="en-US" dirty="0"/>
@@ -6004,7 +5976,7 @@
           </a:lstStyle>
           <a:p>
             <a:r>
-              <a:rPr lang="fr-FR" smtClean="0"/>
+              <a:rPr lang="fr-FR"/>
               <a:t>Modifiez le style du titre</a:t>
             </a:r>
             <a:endParaRPr lang="en-US" dirty="0"/>
@@ -6127,7 +6099,7 @@
           <a:p>
             <a:pPr lvl="0"/>
             <a:r>
-              <a:rPr lang="fr-FR" smtClean="0"/>
+              <a:rPr lang="fr-FR"/>
               <a:t>Modifier les styles du texte du masque</a:t>
             </a:r>
           </a:p>
@@ -6244,7 +6216,7 @@
           <a:lstStyle/>
           <a:p>
             <a:r>
-              <a:rPr lang="fr-FR" smtClean="0"/>
+              <a:rPr lang="fr-FR"/>
               <a:t>Modifiez le style du titre</a:t>
             </a:r>
             <a:endParaRPr lang="en-US" dirty="0"/>
@@ -6273,35 +6245,35 @@
           <a:p>
             <a:pPr lvl="0"/>
             <a:r>
-              <a:rPr lang="fr-FR" smtClean="0"/>
+              <a:rPr lang="fr-FR"/>
               <a:t>Modifier les styles du texte du masque</a:t>
             </a:r>
           </a:p>
           <a:p>
             <a:pPr lvl="1"/>
             <a:r>
-              <a:rPr lang="fr-FR" smtClean="0"/>
+              <a:rPr lang="fr-FR"/>
               <a:t>Deuxième niveau</a:t>
             </a:r>
           </a:p>
           <a:p>
             <a:pPr lvl="2"/>
             <a:r>
-              <a:rPr lang="fr-FR" smtClean="0"/>
+              <a:rPr lang="fr-FR"/>
               <a:t>Troisième niveau</a:t>
             </a:r>
           </a:p>
           <a:p>
             <a:pPr lvl="3"/>
             <a:r>
-              <a:rPr lang="fr-FR" smtClean="0"/>
+              <a:rPr lang="fr-FR"/>
               <a:t>Quatrième niveau</a:t>
             </a:r>
           </a:p>
           <a:p>
             <a:pPr lvl="4"/>
             <a:r>
-              <a:rPr lang="fr-FR" smtClean="0"/>
+              <a:rPr lang="fr-FR"/>
               <a:t>Cinquième niveau</a:t>
             </a:r>
             <a:endParaRPr lang="en-US" dirty="0"/>
@@ -6330,35 +6302,35 @@
           <a:p>
             <a:pPr lvl="0"/>
             <a:r>
-              <a:rPr lang="fr-FR" smtClean="0"/>
+              <a:rPr lang="fr-FR"/>
               <a:t>Modifier les styles du texte du masque</a:t>
             </a:r>
           </a:p>
           <a:p>
             <a:pPr lvl="1"/>
             <a:r>
-              <a:rPr lang="fr-FR" smtClean="0"/>
+              <a:rPr lang="fr-FR"/>
               <a:t>Deuxième niveau</a:t>
             </a:r>
           </a:p>
           <a:p>
             <a:pPr lvl="2"/>
             <a:r>
-              <a:rPr lang="fr-FR" smtClean="0"/>
+              <a:rPr lang="fr-FR"/>
               <a:t>Troisième niveau</a:t>
             </a:r>
           </a:p>
           <a:p>
             <a:pPr lvl="3"/>
             <a:r>
-              <a:rPr lang="fr-FR" smtClean="0"/>
+              <a:rPr lang="fr-FR"/>
               <a:t>Quatrième niveau</a:t>
             </a:r>
           </a:p>
           <a:p>
             <a:pPr lvl="4"/>
             <a:r>
-              <a:rPr lang="fr-FR" smtClean="0"/>
+              <a:rPr lang="fr-FR"/>
               <a:t>Cinquième niveau</a:t>
             </a:r>
             <a:endParaRPr lang="en-US" dirty="0"/>
@@ -6524,7 +6496,7 @@
           <a:p>
             <a:pPr lvl="0"/>
             <a:r>
-              <a:rPr lang="fr-FR" smtClean="0"/>
+              <a:rPr lang="fr-FR"/>
               <a:t>Modifier les styles du texte du masque</a:t>
             </a:r>
           </a:p>
@@ -6552,35 +6524,35 @@
           <a:p>
             <a:pPr lvl="0"/>
             <a:r>
-              <a:rPr lang="fr-FR" smtClean="0"/>
+              <a:rPr lang="fr-FR"/>
               <a:t>Modifier les styles du texte du masque</a:t>
             </a:r>
           </a:p>
           <a:p>
             <a:pPr lvl="1"/>
             <a:r>
-              <a:rPr lang="fr-FR" smtClean="0"/>
+              <a:rPr lang="fr-FR"/>
               <a:t>Deuxième niveau</a:t>
             </a:r>
           </a:p>
           <a:p>
             <a:pPr lvl="2"/>
             <a:r>
-              <a:rPr lang="fr-FR" smtClean="0"/>
+              <a:rPr lang="fr-FR"/>
               <a:t>Troisième niveau</a:t>
             </a:r>
           </a:p>
           <a:p>
             <a:pPr lvl="3"/>
             <a:r>
-              <a:rPr lang="fr-FR" smtClean="0"/>
+              <a:rPr lang="fr-FR"/>
               <a:t>Quatrième niveau</a:t>
             </a:r>
           </a:p>
           <a:p>
             <a:pPr lvl="4"/>
             <a:r>
-              <a:rPr lang="fr-FR" smtClean="0"/>
+              <a:rPr lang="fr-FR"/>
               <a:t>Cinquième niveau</a:t>
             </a:r>
             <a:endParaRPr lang="en-US" dirty="0"/>
@@ -6649,7 +6621,7 @@
           <a:p>
             <a:pPr lvl="0"/>
             <a:r>
-              <a:rPr lang="fr-FR" smtClean="0"/>
+              <a:rPr lang="fr-FR"/>
               <a:t>Modifier les styles du texte du masque</a:t>
             </a:r>
           </a:p>
@@ -6677,35 +6649,35 @@
           <a:p>
             <a:pPr lvl="0"/>
             <a:r>
-              <a:rPr lang="fr-FR" smtClean="0"/>
+              <a:rPr lang="fr-FR"/>
               <a:t>Modifier les styles du texte du masque</a:t>
             </a:r>
           </a:p>
           <a:p>
             <a:pPr lvl="1"/>
             <a:r>
-              <a:rPr lang="fr-FR" smtClean="0"/>
+              <a:rPr lang="fr-FR"/>
               <a:t>Deuxième niveau</a:t>
             </a:r>
           </a:p>
           <a:p>
             <a:pPr lvl="2"/>
             <a:r>
-              <a:rPr lang="fr-FR" smtClean="0"/>
+              <a:rPr lang="fr-FR"/>
               <a:t>Troisième niveau</a:t>
             </a:r>
           </a:p>
           <a:p>
             <a:pPr lvl="3"/>
             <a:r>
-              <a:rPr lang="fr-FR" smtClean="0"/>
+              <a:rPr lang="fr-FR"/>
               <a:t>Quatrième niveau</a:t>
             </a:r>
           </a:p>
           <a:p>
             <a:pPr lvl="4"/>
             <a:r>
-              <a:rPr lang="fr-FR" smtClean="0"/>
+              <a:rPr lang="fr-FR"/>
               <a:t>Cinquième niveau</a:t>
             </a:r>
             <a:endParaRPr lang="en-US"/>
@@ -6793,7 +6765,7 @@
           <a:lstStyle/>
           <a:p>
             <a:r>
-              <a:rPr lang="fr-FR" smtClean="0"/>
+              <a:rPr lang="fr-FR"/>
               <a:t>Modifiez le style du titre</a:t>
             </a:r>
             <a:endParaRPr lang="en-US" dirty="0"/>
@@ -6911,7 +6883,7 @@
           <a:lstStyle/>
           <a:p>
             <a:r>
-              <a:rPr lang="fr-FR" smtClean="0"/>
+              <a:rPr lang="fr-FR"/>
               <a:t>Modifiez le style du titre</a:t>
             </a:r>
             <a:endParaRPr lang="en-US"/>
@@ -7070,7 +7042,7 @@
           </a:lstStyle>
           <a:p>
             <a:r>
-              <a:rPr lang="fr-FR" smtClean="0"/>
+              <a:rPr lang="fr-FR"/>
               <a:t>Modifiez le style du titre</a:t>
             </a:r>
             <a:endParaRPr lang="en-US" dirty="0"/>
@@ -7193,7 +7165,7 @@
           <a:p>
             <a:pPr lvl="0"/>
             <a:r>
-              <a:rPr lang="fr-FR" smtClean="0"/>
+              <a:rPr lang="fr-FR"/>
               <a:t>Modifier les styles du texte du masque</a:t>
             </a:r>
           </a:p>
@@ -7321,7 +7293,7 @@
           </a:lstStyle>
           <a:p>
             <a:r>
-              <a:rPr lang="fr-FR" smtClean="0"/>
+              <a:rPr lang="fr-FR"/>
               <a:t>Modifiez le style du titre</a:t>
             </a:r>
             <a:endParaRPr lang="en-US" dirty="0"/>
@@ -7378,35 +7350,35 @@
           <a:p>
             <a:pPr lvl="0"/>
             <a:r>
-              <a:rPr lang="fr-FR" smtClean="0"/>
+              <a:rPr lang="fr-FR"/>
               <a:t>Modifier les styles du texte du masque</a:t>
             </a:r>
           </a:p>
           <a:p>
             <a:pPr lvl="1"/>
             <a:r>
-              <a:rPr lang="fr-FR" smtClean="0"/>
+              <a:rPr lang="fr-FR"/>
               <a:t>Deuxième niveau</a:t>
             </a:r>
           </a:p>
           <a:p>
             <a:pPr lvl="2"/>
             <a:r>
-              <a:rPr lang="fr-FR" smtClean="0"/>
+              <a:rPr lang="fr-FR"/>
               <a:t>Troisième niveau</a:t>
             </a:r>
           </a:p>
           <a:p>
             <a:pPr lvl="3"/>
             <a:r>
-              <a:rPr lang="fr-FR" smtClean="0"/>
+              <a:rPr lang="fr-FR"/>
               <a:t>Quatrième niveau</a:t>
             </a:r>
           </a:p>
           <a:p>
             <a:pPr lvl="4"/>
             <a:r>
-              <a:rPr lang="fr-FR" smtClean="0"/>
+              <a:rPr lang="fr-FR"/>
               <a:t>Cinquième niveau</a:t>
             </a:r>
             <a:endParaRPr lang="en-US" dirty="0"/>
@@ -7477,7 +7449,7 @@
           <a:p>
             <a:pPr lvl="0"/>
             <a:r>
-              <a:rPr lang="fr-FR" smtClean="0"/>
+              <a:rPr lang="fr-FR"/>
               <a:t>Modifier les styles du texte du masque</a:t>
             </a:r>
           </a:p>
@@ -7605,7 +7577,7 @@
           </a:lstStyle>
           <a:p>
             <a:r>
-              <a:rPr lang="fr-FR" smtClean="0"/>
+              <a:rPr lang="fr-FR"/>
               <a:t>Modifiez le style du titre</a:t>
             </a:r>
             <a:endParaRPr lang="en-US" dirty="0"/>
@@ -7670,7 +7642,7 @@
           </a:lstStyle>
           <a:p>
             <a:r>
-              <a:rPr lang="fr-FR" dirty="0" smtClean="0"/>
+              <a:rPr lang="fr-FR" dirty="0"/>
               <a:t>Cliquez sur l'icône pour ajouter une image</a:t>
             </a:r>
             <a:endParaRPr lang="en-US" dirty="0"/>
@@ -7741,7 +7713,7 @@
           <a:p>
             <a:pPr lvl="0"/>
             <a:r>
-              <a:rPr lang="fr-FR" smtClean="0"/>
+              <a:rPr lang="fr-FR"/>
               <a:t>Modifier les styles du texte du masque</a:t>
             </a:r>
           </a:p>
@@ -7858,7 +7830,7 @@
           <a:lstStyle/>
           <a:p>
             <a:r>
-              <a:rPr lang="fr-FR" smtClean="0"/>
+              <a:rPr lang="fr-FR"/>
               <a:t>Modifiez le style du titre</a:t>
             </a:r>
             <a:endParaRPr lang="en-US"/>
@@ -7882,35 +7854,35 @@
           <a:p>
             <a:pPr lvl="0"/>
             <a:r>
-              <a:rPr lang="fr-FR" smtClean="0"/>
+              <a:rPr lang="fr-FR"/>
               <a:t>Modifier les styles du texte du masque</a:t>
             </a:r>
           </a:p>
           <a:p>
             <a:pPr lvl="1"/>
             <a:r>
-              <a:rPr lang="fr-FR" smtClean="0"/>
+              <a:rPr lang="fr-FR"/>
               <a:t>Deuxième niveau</a:t>
             </a:r>
           </a:p>
           <a:p>
             <a:pPr lvl="2"/>
             <a:r>
-              <a:rPr lang="fr-FR" smtClean="0"/>
+              <a:rPr lang="fr-FR"/>
               <a:t>Troisième niveau</a:t>
             </a:r>
           </a:p>
           <a:p>
             <a:pPr lvl="3"/>
             <a:r>
-              <a:rPr lang="fr-FR" smtClean="0"/>
+              <a:rPr lang="fr-FR"/>
               <a:t>Quatrième niveau</a:t>
             </a:r>
           </a:p>
           <a:p>
             <a:pPr lvl="4"/>
             <a:r>
-              <a:rPr lang="fr-FR" smtClean="0"/>
+              <a:rPr lang="fr-FR"/>
               <a:t>Cinquième niveau</a:t>
             </a:r>
             <a:endParaRPr lang="en-US" dirty="0"/>
@@ -8033,7 +8005,7 @@
           <a:lstStyle/>
           <a:p>
             <a:r>
-              <a:rPr lang="fr-FR" smtClean="0"/>
+              <a:rPr lang="fr-FR"/>
               <a:t>Modifiez le style du titre</a:t>
             </a:r>
             <a:endParaRPr lang="en-US"/>
@@ -8062,35 +8034,35 @@
           <a:p>
             <a:pPr lvl="0"/>
             <a:r>
-              <a:rPr lang="fr-FR" smtClean="0"/>
+              <a:rPr lang="fr-FR"/>
               <a:t>Modifier les styles du texte du masque</a:t>
             </a:r>
           </a:p>
           <a:p>
             <a:pPr lvl="1"/>
             <a:r>
-              <a:rPr lang="fr-FR" smtClean="0"/>
+              <a:rPr lang="fr-FR"/>
               <a:t>Deuxième niveau</a:t>
             </a:r>
           </a:p>
           <a:p>
             <a:pPr lvl="2"/>
             <a:r>
-              <a:rPr lang="fr-FR" smtClean="0"/>
+              <a:rPr lang="fr-FR"/>
               <a:t>Troisième niveau</a:t>
             </a:r>
           </a:p>
           <a:p>
             <a:pPr lvl="3"/>
             <a:r>
-              <a:rPr lang="fr-FR" smtClean="0"/>
+              <a:rPr lang="fr-FR"/>
               <a:t>Quatrième niveau</a:t>
             </a:r>
           </a:p>
           <a:p>
             <a:pPr lvl="4"/>
             <a:r>
-              <a:rPr lang="fr-FR" smtClean="0"/>
+              <a:rPr lang="fr-FR"/>
               <a:t>Cinquième niveau</a:t>
             </a:r>
             <a:endParaRPr lang="en-US"/>
@@ -8217,10 +8189,9 @@
           </a:lstStyle>
           <a:p>
             <a:r>
-              <a:rPr lang="fr-FR" smtClean="0"/>
+              <a:rPr lang="fr-FR"/>
               <a:t>Modifiez le style du titre</a:t>
             </a:r>
-            <a:endParaRPr lang="fr-FR"/>
           </a:p>
         </p:txBody>
       </p:sp>
@@ -8282,10 +8253,9 @@
           </a:lstStyle>
           <a:p>
             <a:r>
-              <a:rPr lang="fr-FR" smtClean="0"/>
+              <a:rPr lang="fr-FR"/>
               <a:t>Modifier le style des sous-titres du masque</a:t>
             </a:r>
-            <a:endParaRPr lang="fr-FR"/>
           </a:p>
         </p:txBody>
       </p:sp>
@@ -8400,10 +8370,9 @@
           <a:lstStyle/>
           <a:p>
             <a:r>
-              <a:rPr lang="fr-FR" smtClean="0"/>
+              <a:rPr lang="fr-FR"/>
               <a:t>Modifiez le style du titre</a:t>
             </a:r>
-            <a:endParaRPr lang="fr-FR"/>
           </a:p>
         </p:txBody>
       </p:sp>
@@ -8424,38 +8393,37 @@
           <a:p>
             <a:pPr lvl="0"/>
             <a:r>
-              <a:rPr lang="fr-FR" smtClean="0"/>
+              <a:rPr lang="fr-FR"/>
               <a:t>Modifier les styles du texte du masque</a:t>
             </a:r>
           </a:p>
           <a:p>
             <a:pPr lvl="1"/>
             <a:r>
-              <a:rPr lang="fr-FR" smtClean="0"/>
+              <a:rPr lang="fr-FR"/>
               <a:t>Deuxième niveau</a:t>
             </a:r>
           </a:p>
           <a:p>
             <a:pPr lvl="2"/>
             <a:r>
-              <a:rPr lang="fr-FR" smtClean="0"/>
+              <a:rPr lang="fr-FR"/>
               <a:t>Troisième niveau</a:t>
             </a:r>
           </a:p>
           <a:p>
             <a:pPr lvl="3"/>
             <a:r>
-              <a:rPr lang="fr-FR" smtClean="0"/>
+              <a:rPr lang="fr-FR"/>
               <a:t>Quatrième niveau</a:t>
             </a:r>
           </a:p>
           <a:p>
             <a:pPr lvl="4"/>
             <a:r>
-              <a:rPr lang="fr-FR" smtClean="0"/>
+              <a:rPr lang="fr-FR"/>
               <a:t>Cinquième niveau</a:t>
             </a:r>
-            <a:endParaRPr lang="fr-FR"/>
           </a:p>
         </p:txBody>
       </p:sp>
@@ -8579,10 +8547,9 @@
           </a:lstStyle>
           <a:p>
             <a:r>
-              <a:rPr lang="fr-FR" smtClean="0"/>
+              <a:rPr lang="fr-FR"/>
               <a:t>Modifiez le style du titre</a:t>
             </a:r>
-            <a:endParaRPr lang="fr-FR"/>
           </a:p>
         </p:txBody>
       </p:sp>
@@ -8699,7 +8666,7 @@
           <a:p>
             <a:pPr lvl="0"/>
             <a:r>
-              <a:rPr lang="fr-FR" smtClean="0"/>
+              <a:rPr lang="fr-FR"/>
               <a:t>Modifier les styles du texte du masque</a:t>
             </a:r>
           </a:p>
@@ -8816,10 +8783,9 @@
           <a:lstStyle/>
           <a:p>
             <a:r>
-              <a:rPr lang="fr-FR" smtClean="0"/>
+              <a:rPr lang="fr-FR"/>
               <a:t>Modifiez le style du titre</a:t>
             </a:r>
-            <a:endParaRPr lang="fr-FR"/>
           </a:p>
         </p:txBody>
       </p:sp>
@@ -8845,38 +8811,37 @@
           <a:p>
             <a:pPr lvl="0"/>
             <a:r>
-              <a:rPr lang="fr-FR" smtClean="0"/>
+              <a:rPr lang="fr-FR"/>
               <a:t>Modifier les styles du texte du masque</a:t>
             </a:r>
           </a:p>
           <a:p>
             <a:pPr lvl="1"/>
             <a:r>
-              <a:rPr lang="fr-FR" smtClean="0"/>
+              <a:rPr lang="fr-FR"/>
               <a:t>Deuxième niveau</a:t>
             </a:r>
           </a:p>
           <a:p>
             <a:pPr lvl="2"/>
             <a:r>
-              <a:rPr lang="fr-FR" smtClean="0"/>
+              <a:rPr lang="fr-FR"/>
               <a:t>Troisième niveau</a:t>
             </a:r>
           </a:p>
           <a:p>
             <a:pPr lvl="3"/>
             <a:r>
-              <a:rPr lang="fr-FR" smtClean="0"/>
+              <a:rPr lang="fr-FR"/>
               <a:t>Quatrième niveau</a:t>
             </a:r>
           </a:p>
           <a:p>
             <a:pPr lvl="4"/>
             <a:r>
-              <a:rPr lang="fr-FR" smtClean="0"/>
+              <a:rPr lang="fr-FR"/>
               <a:t>Cinquième niveau</a:t>
             </a:r>
-            <a:endParaRPr lang="fr-FR"/>
           </a:p>
         </p:txBody>
       </p:sp>
@@ -8902,38 +8867,37 @@
           <a:p>
             <a:pPr lvl="0"/>
             <a:r>
-              <a:rPr lang="fr-FR" smtClean="0"/>
+              <a:rPr lang="fr-FR"/>
               <a:t>Modifier les styles du texte du masque</a:t>
             </a:r>
           </a:p>
           <a:p>
             <a:pPr lvl="1"/>
             <a:r>
-              <a:rPr lang="fr-FR" smtClean="0"/>
+              <a:rPr lang="fr-FR"/>
               <a:t>Deuxième niveau</a:t>
             </a:r>
           </a:p>
           <a:p>
             <a:pPr lvl="2"/>
             <a:r>
-              <a:rPr lang="fr-FR" smtClean="0"/>
+              <a:rPr lang="fr-FR"/>
               <a:t>Troisième niveau</a:t>
             </a:r>
           </a:p>
           <a:p>
             <a:pPr lvl="3"/>
             <a:r>
-              <a:rPr lang="fr-FR" smtClean="0"/>
+              <a:rPr lang="fr-FR"/>
               <a:t>Quatrième niveau</a:t>
             </a:r>
           </a:p>
           <a:p>
             <a:pPr lvl="4"/>
             <a:r>
-              <a:rPr lang="fr-FR" smtClean="0"/>
+              <a:rPr lang="fr-FR"/>
               <a:t>Cinquième niveau</a:t>
             </a:r>
-            <a:endParaRPr lang="fr-FR"/>
           </a:p>
         </p:txBody>
       </p:sp>
@@ -9053,10 +9017,9 @@
           <a:lstStyle/>
           <a:p>
             <a:r>
-              <a:rPr lang="fr-FR" smtClean="0"/>
+              <a:rPr lang="fr-FR"/>
               <a:t>Modifiez le style du titre</a:t>
             </a:r>
-            <a:endParaRPr lang="fr-FR"/>
           </a:p>
         </p:txBody>
       </p:sp>
@@ -9119,7 +9082,7 @@
           <a:p>
             <a:pPr lvl="0"/>
             <a:r>
-              <a:rPr lang="fr-FR" smtClean="0"/>
+              <a:rPr lang="fr-FR"/>
               <a:t>Modifier les styles du texte du masque</a:t>
             </a:r>
           </a:p>
@@ -9147,38 +9110,37 @@
           <a:p>
             <a:pPr lvl="0"/>
             <a:r>
-              <a:rPr lang="fr-FR" smtClean="0"/>
+              <a:rPr lang="fr-FR"/>
               <a:t>Modifier les styles du texte du masque</a:t>
             </a:r>
           </a:p>
           <a:p>
             <a:pPr lvl="1"/>
             <a:r>
-              <a:rPr lang="fr-FR" smtClean="0"/>
+              <a:rPr lang="fr-FR"/>
               <a:t>Deuxième niveau</a:t>
             </a:r>
           </a:p>
           <a:p>
             <a:pPr lvl="2"/>
             <a:r>
-              <a:rPr lang="fr-FR" smtClean="0"/>
+              <a:rPr lang="fr-FR"/>
               <a:t>Troisième niveau</a:t>
             </a:r>
           </a:p>
           <a:p>
             <a:pPr lvl="3"/>
             <a:r>
-              <a:rPr lang="fr-FR" smtClean="0"/>
+              <a:rPr lang="fr-FR"/>
               <a:t>Quatrième niveau</a:t>
             </a:r>
           </a:p>
           <a:p>
             <a:pPr lvl="4"/>
             <a:r>
-              <a:rPr lang="fr-FR" smtClean="0"/>
+              <a:rPr lang="fr-FR"/>
               <a:t>Cinquième niveau</a:t>
             </a:r>
-            <a:endParaRPr lang="fr-FR"/>
           </a:p>
         </p:txBody>
       </p:sp>
@@ -9241,7 +9203,7 @@
           <a:p>
             <a:pPr lvl="0"/>
             <a:r>
-              <a:rPr lang="fr-FR" smtClean="0"/>
+              <a:rPr lang="fr-FR"/>
               <a:t>Modifier les styles du texte du masque</a:t>
             </a:r>
           </a:p>
@@ -9269,38 +9231,37 @@
           <a:p>
             <a:pPr lvl="0"/>
             <a:r>
-              <a:rPr lang="fr-FR" smtClean="0"/>
+              <a:rPr lang="fr-FR"/>
               <a:t>Modifier les styles du texte du masque</a:t>
             </a:r>
           </a:p>
           <a:p>
             <a:pPr lvl="1"/>
             <a:r>
-              <a:rPr lang="fr-FR" smtClean="0"/>
+              <a:rPr lang="fr-FR"/>
               <a:t>Deuxième niveau</a:t>
             </a:r>
           </a:p>
           <a:p>
             <a:pPr lvl="2"/>
             <a:r>
-              <a:rPr lang="fr-FR" smtClean="0"/>
+              <a:rPr lang="fr-FR"/>
               <a:t>Troisième niveau</a:t>
             </a:r>
           </a:p>
           <a:p>
             <a:pPr lvl="3"/>
             <a:r>
-              <a:rPr lang="fr-FR" smtClean="0"/>
+              <a:rPr lang="fr-FR"/>
               <a:t>Quatrième niveau</a:t>
             </a:r>
           </a:p>
           <a:p>
             <a:pPr lvl="4"/>
             <a:r>
-              <a:rPr lang="fr-FR" smtClean="0"/>
+              <a:rPr lang="fr-FR"/>
               <a:t>Cinquième niveau</a:t>
             </a:r>
-            <a:endParaRPr lang="fr-FR"/>
           </a:p>
         </p:txBody>
       </p:sp>
@@ -9415,10 +9376,9 @@
           <a:lstStyle/>
           <a:p>
             <a:r>
-              <a:rPr lang="fr-FR" smtClean="0"/>
+              <a:rPr lang="fr-FR"/>
               <a:t>Modifiez le style du titre</a:t>
             </a:r>
-            <a:endParaRPr lang="fr-FR"/>
           </a:p>
         </p:txBody>
       </p:sp>
@@ -9533,7 +9493,7 @@
           <a:lstStyle/>
           <a:p>
             <a:r>
-              <a:rPr lang="fr-FR" smtClean="0"/>
+              <a:rPr lang="fr-FR"/>
               <a:t>Modifiez le style du titre</a:t>
             </a:r>
             <a:endParaRPr lang="en-US" dirty="0"/>
@@ -9562,35 +9522,35 @@
           <a:p>
             <a:pPr lvl="0"/>
             <a:r>
-              <a:rPr lang="fr-FR" smtClean="0"/>
+              <a:rPr lang="fr-FR"/>
               <a:t>Modifier les styles du texte du masque</a:t>
             </a:r>
           </a:p>
           <a:p>
             <a:pPr lvl="1"/>
             <a:r>
-              <a:rPr lang="fr-FR" smtClean="0"/>
+              <a:rPr lang="fr-FR"/>
               <a:t>Deuxième niveau</a:t>
             </a:r>
           </a:p>
           <a:p>
             <a:pPr lvl="2"/>
             <a:r>
-              <a:rPr lang="fr-FR" smtClean="0"/>
+              <a:rPr lang="fr-FR"/>
               <a:t>Troisième niveau</a:t>
             </a:r>
           </a:p>
           <a:p>
             <a:pPr lvl="3"/>
             <a:r>
-              <a:rPr lang="fr-FR" smtClean="0"/>
+              <a:rPr lang="fr-FR"/>
               <a:t>Quatrième niveau</a:t>
             </a:r>
           </a:p>
           <a:p>
             <a:pPr lvl="4"/>
             <a:r>
-              <a:rPr lang="fr-FR" smtClean="0"/>
+              <a:rPr lang="fr-FR"/>
               <a:t>Cinquième niveau</a:t>
             </a:r>
             <a:endParaRPr lang="en-US" dirty="0"/>
@@ -9619,35 +9579,35 @@
           <a:p>
             <a:pPr lvl="0"/>
             <a:r>
-              <a:rPr lang="fr-FR" smtClean="0"/>
+              <a:rPr lang="fr-FR"/>
               <a:t>Modifier les styles du texte du masque</a:t>
             </a:r>
           </a:p>
           <a:p>
             <a:pPr lvl="1"/>
             <a:r>
-              <a:rPr lang="fr-FR" smtClean="0"/>
+              <a:rPr lang="fr-FR"/>
               <a:t>Deuxième niveau</a:t>
             </a:r>
           </a:p>
           <a:p>
             <a:pPr lvl="2"/>
             <a:r>
-              <a:rPr lang="fr-FR" smtClean="0"/>
+              <a:rPr lang="fr-FR"/>
               <a:t>Troisième niveau</a:t>
             </a:r>
           </a:p>
           <a:p>
             <a:pPr lvl="3"/>
             <a:r>
-              <a:rPr lang="fr-FR" smtClean="0"/>
+              <a:rPr lang="fr-FR"/>
               <a:t>Quatrième niveau</a:t>
             </a:r>
           </a:p>
           <a:p>
             <a:pPr lvl="4"/>
             <a:r>
-              <a:rPr lang="fr-FR" smtClean="0"/>
+              <a:rPr lang="fr-FR"/>
               <a:t>Cinquième niveau</a:t>
             </a:r>
             <a:endParaRPr lang="en-US" dirty="0"/>
@@ -9869,10 +9829,9 @@
           </a:lstStyle>
           <a:p>
             <a:r>
-              <a:rPr lang="fr-FR" smtClean="0"/>
+              <a:rPr lang="fr-FR"/>
               <a:t>Modifiez le style du titre</a:t>
             </a:r>
-            <a:endParaRPr lang="fr-FR"/>
           </a:p>
         </p:txBody>
       </p:sp>
@@ -9926,38 +9885,37 @@
           <a:p>
             <a:pPr lvl="0"/>
             <a:r>
-              <a:rPr lang="fr-FR" smtClean="0"/>
+              <a:rPr lang="fr-FR"/>
               <a:t>Modifier les styles du texte du masque</a:t>
             </a:r>
           </a:p>
           <a:p>
             <a:pPr lvl="1"/>
             <a:r>
-              <a:rPr lang="fr-FR" smtClean="0"/>
+              <a:rPr lang="fr-FR"/>
               <a:t>Deuxième niveau</a:t>
             </a:r>
           </a:p>
           <a:p>
             <a:pPr lvl="2"/>
             <a:r>
-              <a:rPr lang="fr-FR" smtClean="0"/>
+              <a:rPr lang="fr-FR"/>
               <a:t>Troisième niveau</a:t>
             </a:r>
           </a:p>
           <a:p>
             <a:pPr lvl="3"/>
             <a:r>
-              <a:rPr lang="fr-FR" smtClean="0"/>
+              <a:rPr lang="fr-FR"/>
               <a:t>Quatrième niveau</a:t>
             </a:r>
           </a:p>
           <a:p>
             <a:pPr lvl="4"/>
             <a:r>
-              <a:rPr lang="fr-FR" smtClean="0"/>
+              <a:rPr lang="fr-FR"/>
               <a:t>Cinquième niveau</a:t>
             </a:r>
-            <a:endParaRPr lang="fr-FR"/>
           </a:p>
         </p:txBody>
       </p:sp>
@@ -10020,7 +9978,7 @@
           <a:p>
             <a:pPr lvl="0"/>
             <a:r>
-              <a:rPr lang="fr-FR" smtClean="0"/>
+              <a:rPr lang="fr-FR"/>
               <a:t>Modifier les styles du texte du masque</a:t>
             </a:r>
           </a:p>
@@ -10146,10 +10104,9 @@
           </a:lstStyle>
           <a:p>
             <a:r>
-              <a:rPr lang="fr-FR" smtClean="0"/>
+              <a:rPr lang="fr-FR"/>
               <a:t>Modifiez le style du titre</a:t>
             </a:r>
-            <a:endParaRPr lang="fr-FR"/>
           </a:p>
         </p:txBody>
       </p:sp>
@@ -10273,7 +10230,7 @@
           <a:p>
             <a:pPr lvl="0"/>
             <a:r>
-              <a:rPr lang="fr-FR" smtClean="0"/>
+              <a:rPr lang="fr-FR"/>
               <a:t>Modifier les styles du texte du masque</a:t>
             </a:r>
           </a:p>
@@ -10390,10 +10347,9 @@
           <a:lstStyle/>
           <a:p>
             <a:r>
-              <a:rPr lang="fr-FR" smtClean="0"/>
+              <a:rPr lang="fr-FR"/>
               <a:t>Modifiez le style du titre</a:t>
             </a:r>
-            <a:endParaRPr lang="fr-FR"/>
           </a:p>
         </p:txBody>
       </p:sp>
@@ -10414,38 +10370,37 @@
           <a:p>
             <a:pPr lvl="0"/>
             <a:r>
-              <a:rPr lang="fr-FR" smtClean="0"/>
+              <a:rPr lang="fr-FR"/>
               <a:t>Modifier les styles du texte du masque</a:t>
             </a:r>
           </a:p>
           <a:p>
             <a:pPr lvl="1"/>
             <a:r>
-              <a:rPr lang="fr-FR" smtClean="0"/>
+              <a:rPr lang="fr-FR"/>
               <a:t>Deuxième niveau</a:t>
             </a:r>
           </a:p>
           <a:p>
             <a:pPr lvl="2"/>
             <a:r>
-              <a:rPr lang="fr-FR" smtClean="0"/>
+              <a:rPr lang="fr-FR"/>
               <a:t>Troisième niveau</a:t>
             </a:r>
           </a:p>
           <a:p>
             <a:pPr lvl="3"/>
             <a:r>
-              <a:rPr lang="fr-FR" smtClean="0"/>
+              <a:rPr lang="fr-FR"/>
               <a:t>Quatrième niveau</a:t>
             </a:r>
           </a:p>
           <a:p>
             <a:pPr lvl="4"/>
             <a:r>
-              <a:rPr lang="fr-FR" smtClean="0"/>
+              <a:rPr lang="fr-FR"/>
               <a:t>Cinquième niveau</a:t>
             </a:r>
-            <a:endParaRPr lang="fr-FR"/>
           </a:p>
         </p:txBody>
       </p:sp>
@@ -10565,10 +10520,9 @@
           <a:lstStyle/>
           <a:p>
             <a:r>
-              <a:rPr lang="fr-FR" smtClean="0"/>
+              <a:rPr lang="fr-FR"/>
               <a:t>Modifiez le style du titre</a:t>
             </a:r>
-            <a:endParaRPr lang="fr-FR"/>
           </a:p>
         </p:txBody>
       </p:sp>
@@ -10594,38 +10548,37 @@
           <a:p>
             <a:pPr lvl="0"/>
             <a:r>
-              <a:rPr lang="fr-FR" smtClean="0"/>
+              <a:rPr lang="fr-FR"/>
               <a:t>Modifier les styles du texte du masque</a:t>
             </a:r>
           </a:p>
           <a:p>
             <a:pPr lvl="1"/>
             <a:r>
-              <a:rPr lang="fr-FR" smtClean="0"/>
+              <a:rPr lang="fr-FR"/>
               <a:t>Deuxième niveau</a:t>
             </a:r>
           </a:p>
           <a:p>
             <a:pPr lvl="2"/>
             <a:r>
-              <a:rPr lang="fr-FR" smtClean="0"/>
+              <a:rPr lang="fr-FR"/>
               <a:t>Troisième niveau</a:t>
             </a:r>
           </a:p>
           <a:p>
             <a:pPr lvl="3"/>
             <a:r>
-              <a:rPr lang="fr-FR" smtClean="0"/>
+              <a:rPr lang="fr-FR"/>
               <a:t>Quatrième niveau</a:t>
             </a:r>
           </a:p>
           <a:p>
             <a:pPr lvl="4"/>
             <a:r>
-              <a:rPr lang="fr-FR" smtClean="0"/>
+              <a:rPr lang="fr-FR"/>
               <a:t>Cinquième niveau</a:t>
             </a:r>
-            <a:endParaRPr lang="fr-FR"/>
           </a:p>
         </p:txBody>
       </p:sp>
@@ -10788,7 +10741,7 @@
           <a:p>
             <a:pPr lvl="0"/>
             <a:r>
-              <a:rPr lang="fr-FR" smtClean="0"/>
+              <a:rPr lang="fr-FR"/>
               <a:t>Modifier les styles du texte du masque</a:t>
             </a:r>
           </a:p>
@@ -10816,35 +10769,35 @@
           <a:p>
             <a:pPr lvl="0"/>
             <a:r>
-              <a:rPr lang="fr-FR" smtClean="0"/>
+              <a:rPr lang="fr-FR"/>
               <a:t>Modifier les styles du texte du masque</a:t>
             </a:r>
           </a:p>
           <a:p>
             <a:pPr lvl="1"/>
             <a:r>
-              <a:rPr lang="fr-FR" smtClean="0"/>
+              <a:rPr lang="fr-FR"/>
               <a:t>Deuxième niveau</a:t>
             </a:r>
           </a:p>
           <a:p>
             <a:pPr lvl="2"/>
             <a:r>
-              <a:rPr lang="fr-FR" smtClean="0"/>
+              <a:rPr lang="fr-FR"/>
               <a:t>Troisième niveau</a:t>
             </a:r>
           </a:p>
           <a:p>
             <a:pPr lvl="3"/>
             <a:r>
-              <a:rPr lang="fr-FR" smtClean="0"/>
+              <a:rPr lang="fr-FR"/>
               <a:t>Quatrième niveau</a:t>
             </a:r>
           </a:p>
           <a:p>
             <a:pPr lvl="4"/>
             <a:r>
-              <a:rPr lang="fr-FR" smtClean="0"/>
+              <a:rPr lang="fr-FR"/>
               <a:t>Cinquième niveau</a:t>
             </a:r>
             <a:endParaRPr lang="en-US" dirty="0"/>
@@ -10913,7 +10866,7 @@
           <a:p>
             <a:pPr lvl="0"/>
             <a:r>
-              <a:rPr lang="fr-FR" smtClean="0"/>
+              <a:rPr lang="fr-FR"/>
               <a:t>Modifier les styles du texte du masque</a:t>
             </a:r>
           </a:p>
@@ -10941,35 +10894,35 @@
           <a:p>
             <a:pPr lvl="0"/>
             <a:r>
-              <a:rPr lang="fr-FR" smtClean="0"/>
+              <a:rPr lang="fr-FR"/>
               <a:t>Modifier les styles du texte du masque</a:t>
             </a:r>
           </a:p>
           <a:p>
             <a:pPr lvl="1"/>
             <a:r>
-              <a:rPr lang="fr-FR" smtClean="0"/>
+              <a:rPr lang="fr-FR"/>
               <a:t>Deuxième niveau</a:t>
             </a:r>
           </a:p>
           <a:p>
             <a:pPr lvl="2"/>
             <a:r>
-              <a:rPr lang="fr-FR" smtClean="0"/>
+              <a:rPr lang="fr-FR"/>
               <a:t>Troisième niveau</a:t>
             </a:r>
           </a:p>
           <a:p>
             <a:pPr lvl="3"/>
             <a:r>
-              <a:rPr lang="fr-FR" smtClean="0"/>
+              <a:rPr lang="fr-FR"/>
               <a:t>Quatrième niveau</a:t>
             </a:r>
           </a:p>
           <a:p>
             <a:pPr lvl="4"/>
             <a:r>
-              <a:rPr lang="fr-FR" smtClean="0"/>
+              <a:rPr lang="fr-FR"/>
               <a:t>Cinquième niveau</a:t>
             </a:r>
             <a:endParaRPr lang="en-US"/>
@@ -11057,7 +11010,7 @@
           <a:lstStyle/>
           <a:p>
             <a:r>
-              <a:rPr lang="fr-FR" smtClean="0"/>
+              <a:rPr lang="fr-FR"/>
               <a:t>Modifiez le style du titre</a:t>
             </a:r>
             <a:endParaRPr lang="en-US" dirty="0"/>
@@ -11175,7 +11128,7 @@
           <a:lstStyle/>
           <a:p>
             <a:r>
-              <a:rPr lang="fr-FR" smtClean="0"/>
+              <a:rPr lang="fr-FR"/>
               <a:t>Modifiez le style du titre</a:t>
             </a:r>
             <a:endParaRPr lang="en-US"/>
@@ -11334,7 +11287,7 @@
           </a:lstStyle>
           <a:p>
             <a:r>
-              <a:rPr lang="fr-FR" smtClean="0"/>
+              <a:rPr lang="fr-FR"/>
               <a:t>Modifiez le style du titre</a:t>
             </a:r>
             <a:endParaRPr lang="en-US" dirty="0"/>
@@ -11391,35 +11344,35 @@
           <a:p>
             <a:pPr lvl="0"/>
             <a:r>
-              <a:rPr lang="fr-FR" smtClean="0"/>
+              <a:rPr lang="fr-FR"/>
               <a:t>Modifier les styles du texte du masque</a:t>
             </a:r>
           </a:p>
           <a:p>
             <a:pPr lvl="1"/>
             <a:r>
-              <a:rPr lang="fr-FR" smtClean="0"/>
+              <a:rPr lang="fr-FR"/>
               <a:t>Deuxième niveau</a:t>
             </a:r>
           </a:p>
           <a:p>
             <a:pPr lvl="2"/>
             <a:r>
-              <a:rPr lang="fr-FR" smtClean="0"/>
+              <a:rPr lang="fr-FR"/>
               <a:t>Troisième niveau</a:t>
             </a:r>
           </a:p>
           <a:p>
             <a:pPr lvl="3"/>
             <a:r>
-              <a:rPr lang="fr-FR" smtClean="0"/>
+              <a:rPr lang="fr-FR"/>
               <a:t>Quatrième niveau</a:t>
             </a:r>
           </a:p>
           <a:p>
             <a:pPr lvl="4"/>
             <a:r>
-              <a:rPr lang="fr-FR" smtClean="0"/>
+              <a:rPr lang="fr-FR"/>
               <a:t>Cinquième niveau</a:t>
             </a:r>
             <a:endParaRPr lang="en-US" dirty="0"/>
@@ -11490,7 +11443,7 @@
           <a:p>
             <a:pPr lvl="0"/>
             <a:r>
-              <a:rPr lang="fr-FR" smtClean="0"/>
+              <a:rPr lang="fr-FR"/>
               <a:t>Modifier les styles du texte du masque</a:t>
             </a:r>
           </a:p>
@@ -11618,7 +11571,7 @@
           </a:lstStyle>
           <a:p>
             <a:r>
-              <a:rPr lang="fr-FR" smtClean="0"/>
+              <a:rPr lang="fr-FR"/>
               <a:t>Modifiez le style du titre</a:t>
             </a:r>
             <a:endParaRPr lang="en-US" dirty="0"/>
@@ -11683,7 +11636,7 @@
           </a:lstStyle>
           <a:p>
             <a:r>
-              <a:rPr lang="fr-FR" dirty="0" smtClean="0"/>
+              <a:rPr lang="fr-FR" dirty="0"/>
               <a:t>Cliquez sur l'icône pour ajouter une image</a:t>
             </a:r>
             <a:endParaRPr lang="en-US" dirty="0"/>
@@ -11754,7 +11707,7 @@
           <a:p>
             <a:pPr lvl="0"/>
             <a:r>
-              <a:rPr lang="fr-FR" smtClean="0"/>
+              <a:rPr lang="fr-FR"/>
               <a:t>Modifier les styles du texte du masque</a:t>
             </a:r>
           </a:p>
@@ -11886,7 +11839,7 @@
           <a:lstStyle/>
           <a:p>
             <a:r>
-              <a:rPr lang="fr-FR" smtClean="0"/>
+              <a:rPr lang="fr-FR"/>
               <a:t>Modifiez le style du titre</a:t>
             </a:r>
             <a:endParaRPr lang="en-US" dirty="0"/>
@@ -11920,35 +11873,35 @@
           <a:p>
             <a:pPr lvl="0"/>
             <a:r>
-              <a:rPr lang="fr-FR" smtClean="0"/>
+              <a:rPr lang="fr-FR"/>
               <a:t>Modifier les styles du texte du masque</a:t>
             </a:r>
           </a:p>
           <a:p>
             <a:pPr lvl="1"/>
             <a:r>
-              <a:rPr lang="fr-FR" smtClean="0"/>
+              <a:rPr lang="fr-FR"/>
               <a:t>Deuxième niveau</a:t>
             </a:r>
           </a:p>
           <a:p>
             <a:pPr lvl="2"/>
             <a:r>
-              <a:rPr lang="fr-FR" smtClean="0"/>
+              <a:rPr lang="fr-FR"/>
               <a:t>Troisième niveau</a:t>
             </a:r>
           </a:p>
           <a:p>
             <a:pPr lvl="3"/>
             <a:r>
-              <a:rPr lang="fr-FR" smtClean="0"/>
+              <a:rPr lang="fr-FR"/>
               <a:t>Quatrième niveau</a:t>
             </a:r>
           </a:p>
           <a:p>
             <a:pPr lvl="4"/>
             <a:r>
-              <a:rPr lang="fr-FR" smtClean="0"/>
+              <a:rPr lang="fr-FR"/>
               <a:t>Cinquième niveau</a:t>
             </a:r>
             <a:endParaRPr lang="en-US" dirty="0"/>
@@ -12416,7 +12369,7 @@
           <a:lstStyle/>
           <a:p>
             <a:r>
-              <a:rPr lang="fr-FR" smtClean="0"/>
+              <a:rPr lang="fr-FR"/>
               <a:t>Modifiez le style du titre</a:t>
             </a:r>
             <a:endParaRPr lang="en-US" dirty="0"/>
@@ -12450,35 +12403,35 @@
           <a:p>
             <a:pPr lvl="0"/>
             <a:r>
-              <a:rPr lang="fr-FR" smtClean="0"/>
+              <a:rPr lang="fr-FR"/>
               <a:t>Modifier les styles du texte du masque</a:t>
             </a:r>
           </a:p>
           <a:p>
             <a:pPr lvl="1"/>
             <a:r>
-              <a:rPr lang="fr-FR" smtClean="0"/>
+              <a:rPr lang="fr-FR"/>
               <a:t>Deuxième niveau</a:t>
             </a:r>
           </a:p>
           <a:p>
             <a:pPr lvl="2"/>
             <a:r>
-              <a:rPr lang="fr-FR" smtClean="0"/>
+              <a:rPr lang="fr-FR"/>
               <a:t>Troisième niveau</a:t>
             </a:r>
           </a:p>
           <a:p>
             <a:pPr lvl="3"/>
             <a:r>
-              <a:rPr lang="fr-FR" smtClean="0"/>
+              <a:rPr lang="fr-FR"/>
               <a:t>Quatrième niveau</a:t>
             </a:r>
           </a:p>
           <a:p>
             <a:pPr lvl="4"/>
             <a:r>
-              <a:rPr lang="fr-FR" smtClean="0"/>
+              <a:rPr lang="fr-FR"/>
               <a:t>Cinquième niveau</a:t>
             </a:r>
             <a:endParaRPr lang="en-US" dirty="0"/>
@@ -12946,7 +12899,7 @@
           <a:lstStyle/>
           <a:p>
             <a:r>
-              <a:rPr lang="fr-FR" smtClean="0"/>
+              <a:rPr lang="fr-FR"/>
               <a:t>Modifiez le style du titre</a:t>
             </a:r>
             <a:endParaRPr lang="en-US" dirty="0"/>
@@ -12980,35 +12933,35 @@
           <a:p>
             <a:pPr lvl="0"/>
             <a:r>
-              <a:rPr lang="fr-FR" smtClean="0"/>
+              <a:rPr lang="fr-FR"/>
               <a:t>Modifier les styles du texte du masque</a:t>
             </a:r>
           </a:p>
           <a:p>
             <a:pPr lvl="1"/>
             <a:r>
-              <a:rPr lang="fr-FR" smtClean="0"/>
+              <a:rPr lang="fr-FR"/>
               <a:t>Deuxième niveau</a:t>
             </a:r>
           </a:p>
           <a:p>
             <a:pPr lvl="2"/>
             <a:r>
-              <a:rPr lang="fr-FR" smtClean="0"/>
+              <a:rPr lang="fr-FR"/>
               <a:t>Troisième niveau</a:t>
             </a:r>
           </a:p>
           <a:p>
             <a:pPr lvl="3"/>
             <a:r>
-              <a:rPr lang="fr-FR" smtClean="0"/>
+              <a:rPr lang="fr-FR"/>
               <a:t>Quatrième niveau</a:t>
             </a:r>
           </a:p>
           <a:p>
             <a:pPr lvl="4"/>
             <a:r>
-              <a:rPr lang="fr-FR" smtClean="0"/>
+              <a:rPr lang="fr-FR"/>
               <a:t>Cinquième niveau</a:t>
             </a:r>
             <a:endParaRPr lang="en-US" dirty="0"/>
@@ -13476,10 +13429,9 @@
           <a:lstStyle/>
           <a:p>
             <a:r>
-              <a:rPr lang="fr-FR" smtClean="0"/>
+              <a:rPr lang="fr-FR"/>
               <a:t>Modifiez le style du titre</a:t>
             </a:r>
-            <a:endParaRPr lang="fr-FR"/>
           </a:p>
         </p:txBody>
       </p:sp>
@@ -13510,38 +13462,37 @@
           <a:p>
             <a:pPr lvl="0"/>
             <a:r>
-              <a:rPr lang="fr-FR" smtClean="0"/>
+              <a:rPr lang="fr-FR"/>
               <a:t>Modifier les styles du texte du masque</a:t>
             </a:r>
           </a:p>
           <a:p>
             <a:pPr lvl="1"/>
             <a:r>
-              <a:rPr lang="fr-FR" smtClean="0"/>
+              <a:rPr lang="fr-FR"/>
               <a:t>Deuxième niveau</a:t>
             </a:r>
           </a:p>
           <a:p>
             <a:pPr lvl="2"/>
             <a:r>
-              <a:rPr lang="fr-FR" smtClean="0"/>
+              <a:rPr lang="fr-FR"/>
               <a:t>Troisième niveau</a:t>
             </a:r>
           </a:p>
           <a:p>
             <a:pPr lvl="3"/>
             <a:r>
-              <a:rPr lang="fr-FR" smtClean="0"/>
+              <a:rPr lang="fr-FR"/>
               <a:t>Quatrième niveau</a:t>
             </a:r>
           </a:p>
           <a:p>
             <a:pPr lvl="4"/>
             <a:r>
-              <a:rPr lang="fr-FR" smtClean="0"/>
+              <a:rPr lang="fr-FR"/>
               <a:t>Cinquième niveau</a:t>
             </a:r>
-            <a:endParaRPr lang="fr-FR"/>
           </a:p>
         </p:txBody>
       </p:sp>
@@ -14061,51 +14012,39 @@
           </a:bodyPr>
           <a:lstStyle/>
           <a:p>
-            <a:r>
-              <a:rPr lang="fr-FR" b="1" dirty="0" smtClean="0"/>
-              <a:t/>
-            </a:r>
             <a:br>
-              <a:rPr lang="fr-FR" b="1" dirty="0" smtClean="0"/>
+              <a:rPr lang="fr-FR" b="1" dirty="0"/>
             </a:br>
             <a:r>
-              <a:rPr lang="en-GB" b="1" dirty="0" smtClean="0"/>
+              <a:rPr lang="en-GB" b="1" dirty="0"/>
               <a:t>Optimized</a:t>
             </a:r>
             <a:r>
-              <a:rPr lang="fr-FR" b="1" dirty="0" smtClean="0"/>
+              <a:rPr lang="fr-FR" b="1" dirty="0"/>
               <a:t> route for </a:t>
             </a:r>
             <a:r>
-              <a:rPr lang="en-GB" b="1" dirty="0" smtClean="0"/>
+              <a:rPr lang="en-GB" b="1" dirty="0"/>
               <a:t>electric</a:t>
             </a:r>
             <a:r>
-              <a:rPr lang="fr-FR" b="1" dirty="0" smtClean="0"/>
+              <a:rPr lang="fr-FR" b="1" dirty="0"/>
               <a:t> </a:t>
             </a:r>
             <a:r>
-              <a:rPr lang="en-GB" b="1" dirty="0" smtClean="0"/>
+              <a:rPr lang="en-GB" b="1" dirty="0"/>
               <a:t>vehicles</a:t>
             </a:r>
-            <a:r>
-              <a:rPr lang="fr-FR" b="1" dirty="0" smtClean="0"/>
-              <a:t/>
-            </a:r>
             <a:br>
-              <a:rPr lang="fr-FR" b="1" dirty="0" smtClean="0"/>
+              <a:rPr lang="fr-FR" b="1" dirty="0"/>
             </a:br>
             <a:r>
-              <a:rPr lang="en-GB" sz="3200" b="1" dirty="0" smtClean="0"/>
+              <a:rPr lang="en-GB" sz="3200" b="1" dirty="0"/>
               <a:t>from</a:t>
             </a:r>
             <a:r>
-              <a:rPr lang="fr-FR" sz="3200" b="1" dirty="0" smtClean="0"/>
-              <a:t> </a:t>
-            </a:r>
-            <a:r>
-              <a:rPr lang="fr-FR" sz="3200" b="1" dirty="0" smtClean="0"/>
-              <a:t>25/03/2018 to 23/04/2018</a:t>
+              <a:rPr lang="fr-FR" sz="3200" b="1" dirty="0"/>
+              <a:t> 25/03/2018 to 23/04/2018</a:t>
             </a:r>
             <a:endParaRPr lang="fr-FR" sz="4900" b="1" dirty="0">
               <a:solidFill>
@@ -14138,32 +14077,31 @@
           <a:lstStyle/>
           <a:p>
             <a:r>
-              <a:rPr lang="en-GB" dirty="0" smtClean="0"/>
+              <a:rPr lang="en-GB" dirty="0"/>
               <a:t>LIU Jixiong  | MANGEARD </a:t>
             </a:r>
             <a:r>
-              <a:rPr lang="en-GB" dirty="0" err="1" smtClean="0"/>
+              <a:rPr lang="en-GB" dirty="0" err="1"/>
               <a:t>Benoît</a:t>
             </a:r>
             <a:r>
-              <a:rPr lang="en-GB" dirty="0" smtClean="0"/>
+              <a:rPr lang="en-GB" dirty="0"/>
               <a:t> | OBAME EDOU Yves William </a:t>
             </a:r>
           </a:p>
           <a:p>
             <a:r>
-              <a:rPr lang="en-GB" dirty="0" smtClean="0"/>
+              <a:rPr lang="en-GB" dirty="0"/>
               <a:t>XUAN </a:t>
             </a:r>
             <a:r>
-              <a:rPr lang="en-GB" dirty="0" err="1" smtClean="0"/>
+              <a:rPr lang="en-GB" dirty="0" err="1"/>
               <a:t>Yuang</a:t>
             </a:r>
             <a:r>
-              <a:rPr lang="en-GB" dirty="0" smtClean="0"/>
+              <a:rPr lang="en-GB" dirty="0"/>
               <a:t> | MAILLY Charles</a:t>
             </a:r>
-            <a:endParaRPr lang="en-GB" dirty="0"/>
           </a:p>
         </p:txBody>
       </p:sp>
@@ -14220,34 +14158,34 @@
           <a:lstStyle/>
           <a:p>
             <a:r>
-              <a:rPr lang="en-GB" dirty="0" smtClean="0"/>
+              <a:rPr lang="en-GB" dirty="0"/>
               <a:t>Advisor:</a:t>
             </a:r>
           </a:p>
           <a:p>
-            <a:endParaRPr lang="en-GB" dirty="0" smtClean="0"/>
-          </a:p>
-          <a:p>
-            <a:r>
-              <a:rPr lang="en-GB" dirty="0" smtClean="0"/>
+            <a:endParaRPr lang="en-GB" dirty="0"/>
+          </a:p>
+          <a:p>
+            <a:r>
+              <a:rPr lang="en-GB" dirty="0"/>
               <a:t>BERRADIA </a:t>
             </a:r>
             <a:r>
-              <a:rPr lang="en-GB" dirty="0" err="1" smtClean="0"/>
+              <a:rPr lang="en-GB" dirty="0" err="1"/>
               <a:t>Tahar</a:t>
             </a:r>
             <a:r>
-              <a:rPr lang="en-GB" dirty="0" smtClean="0"/>
+              <a:rPr lang="en-GB" dirty="0"/>
               <a:t> </a:t>
             </a:r>
           </a:p>
           <a:p>
             <a:r>
-              <a:rPr lang="en-GB" dirty="0" smtClean="0"/>
+              <a:rPr lang="en-GB" dirty="0"/>
               <a:t>TROJET </a:t>
             </a:r>
             <a:r>
-              <a:rPr lang="en-GB" dirty="0" err="1" smtClean="0"/>
+              <a:rPr lang="en-GB" dirty="0" err="1"/>
               <a:t>Wassim</a:t>
             </a:r>
             <a:endParaRPr lang="en-GB" dirty="0"/>
@@ -14264,13 +14202,6 @@
   <p:clrMapOvr>
     <a:masterClrMapping/>
   </p:clrMapOvr>
-  <p:timing>
-    <p:tnLst>
-      <p:par>
-        <p:cTn id="1" dur="indefinite" restart="never" nodeType="tmRoot"/>
-      </p:par>
-    </p:tnLst>
-  </p:timing>
 </p:sld>
 </file>
 
@@ -14435,8 +14366,8 @@
         </p:nvSpPr>
         <p:spPr>
           <a:xfrm>
-            <a:off x="8575964" y="1993910"/>
-            <a:ext cx="3616036" cy="646331"/>
+            <a:off x="8465127" y="1862842"/>
+            <a:ext cx="3616036" cy="923330"/>
           </a:xfrm>
           <a:prstGeom prst="rect">
             <a:avLst/>
@@ -14449,18 +14380,18 @@
           </a:bodyPr>
           <a:lstStyle/>
           <a:p>
-            <a:r>
-              <a:rPr lang="en-GB" b="1" dirty="0" smtClean="0"/>
-              <a:t/>
-            </a:r>
+            <a:pPr algn="just"/>
             <a:br>
-              <a:rPr lang="en-GB" b="1" dirty="0" smtClean="0"/>
+              <a:rPr lang="en-GB" b="1" dirty="0"/>
             </a:br>
             <a:r>
-              <a:rPr lang="en-GB" dirty="0" smtClean="0"/>
-              <a:t>Optimized route </a:t>
-            </a:r>
-            <a:endParaRPr lang="en-GB" dirty="0"/>
+              <a:rPr lang="en-GB" b="1" dirty="0"/>
+              <a:t>Electric vehicles can reach it’s destination by this optimized route</a:t>
+            </a:r>
+            <a:r>
+              <a:rPr lang="en-GB" dirty="0"/>
+              <a:t> </a:t>
+            </a:r>
           </a:p>
         </p:txBody>
       </p:sp>
@@ -14472,8 +14403,8 @@
         </p:nvSpPr>
         <p:spPr>
           <a:xfrm>
-            <a:off x="1780309" y="5076069"/>
-            <a:ext cx="3616036" cy="646331"/>
+            <a:off x="1602439" y="5332927"/>
+            <a:ext cx="1730326" cy="369332"/>
           </a:xfrm>
           <a:prstGeom prst="rect">
             <a:avLst/>
@@ -14487,17 +14418,9 @@
           <a:lstStyle/>
           <a:p>
             <a:r>
-              <a:rPr lang="en-GB" dirty="0" smtClean="0"/>
-              <a:t/>
-            </a:r>
-            <a:br>
-              <a:rPr lang="en-GB" dirty="0" smtClean="0"/>
-            </a:br>
-            <a:r>
-              <a:rPr lang="en-GB" dirty="0" smtClean="0"/>
-              <a:t>Electric vehicles</a:t>
-            </a:r>
-            <a:endParaRPr lang="en-GB" dirty="0"/>
+              <a:rPr lang="en-GB" b="1" dirty="0"/>
+              <a:t>Recharging time</a:t>
+            </a:r>
           </a:p>
         </p:txBody>
       </p:sp>
@@ -14509,8 +14432,8 @@
         </p:nvSpPr>
         <p:spPr>
           <a:xfrm>
-            <a:off x="3435928" y="5399234"/>
-            <a:ext cx="706582" cy="236720"/>
+            <a:off x="3439764" y="5435782"/>
+            <a:ext cx="706582" cy="163621"/>
           </a:xfrm>
           <a:prstGeom prst="rightArrow">
             <a:avLst/>
@@ -14552,8 +14475,8 @@
         </p:nvSpPr>
         <p:spPr>
           <a:xfrm rot="10800000">
-            <a:off x="7758545" y="2324507"/>
-            <a:ext cx="706582" cy="236720"/>
+            <a:off x="7758545" y="2405575"/>
+            <a:ext cx="706582" cy="155652"/>
           </a:xfrm>
           <a:prstGeom prst="rightArrow">
             <a:avLst/>
@@ -14597,13 +14520,6 @@
   <p:clrMapOvr>
     <a:masterClrMapping/>
   </p:clrMapOvr>
-  <p:timing>
-    <p:tnLst>
-      <p:par>
-        <p:cTn id="1" dur="indefinite" restart="never" nodeType="tmRoot"/>
-      </p:par>
-    </p:tnLst>
-  </p:timing>
 </p:sld>
 </file>
 
@@ -14694,7 +14610,7 @@
           <a:lstStyle/>
           <a:p>
             <a:r>
-              <a:rPr lang="fr-FR" b="1" dirty="0" smtClean="0"/>
+              <a:rPr lang="fr-FR" b="1" dirty="0"/>
               <a:t>PLAN</a:t>
             </a:r>
             <a:endParaRPr lang="fr-FR" dirty="0"/>
@@ -14717,46 +14633,46 @@
           <a:lstStyle/>
           <a:p>
             <a:r>
-              <a:rPr lang="en-GB" dirty="0" smtClean="0"/>
+              <a:rPr lang="en-GB" dirty="0"/>
               <a:t>  I) Generate the data</a:t>
             </a:r>
           </a:p>
           <a:p>
+            <a:pPr lvl="2"/>
+            <a:r>
+              <a:rPr lang="en-GB" dirty="0"/>
+              <a:t>Simplification</a:t>
+            </a:r>
+          </a:p>
+          <a:p>
+            <a:pPr lvl="2"/>
+            <a:r>
+              <a:rPr lang="en-GB" dirty="0"/>
+              <a:t>Generate the database</a:t>
+            </a:r>
+          </a:p>
+          <a:p>
+            <a:r>
+              <a:rPr lang="en-GB" dirty="0"/>
+              <a:t> II) Find a best path</a:t>
+            </a:r>
+          </a:p>
+          <a:p>
             <a:pPr lvl="1"/>
-            <a:r>
-              <a:rPr lang="en-GB" dirty="0" smtClean="0"/>
-              <a:t>Simplification</a:t>
-            </a:r>
-          </a:p>
-          <a:p>
-            <a:pPr lvl="1"/>
-            <a:r>
-              <a:rPr lang="en-GB" dirty="0" smtClean="0"/>
-              <a:t>Generate the database</a:t>
-            </a:r>
-          </a:p>
-          <a:p>
-            <a:r>
-              <a:rPr lang="en-GB" dirty="0" smtClean="0"/>
-              <a:t> II) Find a best path</a:t>
-            </a:r>
-          </a:p>
-          <a:p>
-            <a:pPr lvl="1"/>
-            <a:endParaRPr lang="en-GB" dirty="0" smtClean="0"/>
-          </a:p>
-          <a:p>
-            <a:r>
-              <a:rPr lang="en-GB" dirty="0" smtClean="0"/>
+            <a:endParaRPr lang="en-GB" dirty="0"/>
+          </a:p>
+          <a:p>
+            <a:r>
+              <a:rPr lang="en-GB" dirty="0"/>
               <a:t>III) Display the map in a site</a:t>
             </a:r>
           </a:p>
           <a:p>
-            <a:endParaRPr lang="en-GB" dirty="0" smtClean="0"/>
-          </a:p>
-          <a:p>
-            <a:r>
-              <a:rPr lang="en-GB" dirty="0" smtClean="0"/>
+            <a:endParaRPr lang="en-GB" dirty="0"/>
+          </a:p>
+          <a:p>
+            <a:r>
+              <a:rPr lang="en-GB" dirty="0"/>
               <a:t>IV)Conclusion</a:t>
             </a:r>
           </a:p>
@@ -14775,13 +14691,6 @@
   <p:clrMapOvr>
     <a:masterClrMapping/>
   </p:clrMapOvr>
-  <p:timing>
-    <p:tnLst>
-      <p:par>
-        <p:cTn id="1" dur="indefinite" restart="never" nodeType="tmRoot"/>
-      </p:par>
-    </p:tnLst>
-  </p:timing>
 </p:sld>
 </file>
 
@@ -14914,14 +14823,9 @@
           <a:lstStyle/>
           <a:p>
             <a:r>
-              <a:rPr lang="en-GB" dirty="0" smtClean="0"/>
-              <a:t>B</a:t>
-            </a:r>
-            <a:r>
-              <a:rPr lang="en-GB" dirty="0" smtClean="0"/>
-              <a:t>efore:</a:t>
-            </a:r>
-            <a:endParaRPr lang="en-GB" dirty="0"/>
+              <a:rPr lang="en-GB" dirty="0"/>
+              <a:t>Before:</a:t>
+            </a:r>
           </a:p>
         </p:txBody>
       </p:sp>
@@ -14948,14 +14852,9 @@
           <a:lstStyle/>
           <a:p>
             <a:r>
-              <a:rPr lang="en-GB" dirty="0" smtClean="0"/>
-              <a:t>A</a:t>
-            </a:r>
-            <a:r>
-              <a:rPr lang="en-GB" dirty="0" smtClean="0"/>
-              <a:t>fter:</a:t>
-            </a:r>
-            <a:endParaRPr lang="en-GB" dirty="0"/>
+              <a:rPr lang="en-GB" dirty="0"/>
+              <a:t>After:</a:t>
+            </a:r>
           </a:p>
         </p:txBody>
       </p:sp>
@@ -14991,13 +14890,6 @@
   <p:clrMapOvr>
     <a:masterClrMapping/>
   </p:clrMapOvr>
-  <p:timing>
-    <p:tnLst>
-      <p:par>
-        <p:cTn id="1" dur="indefinite" restart="never" nodeType="tmRoot"/>
-      </p:par>
-    </p:tnLst>
-  </p:timing>
 </p:sld>
 </file>
 
@@ -15214,18 +15106,13 @@
                 </a:spcAft>
               </a:pPr>
               <a:r>
-                <a:rPr lang="en-GB" sz="2100" kern="1200" dirty="0" smtClean="0">
+                <a:rPr lang="en-GB" sz="2100" kern="1200" dirty="0">
                   <a:solidFill>
                     <a:schemeClr val="tx1"/>
                   </a:solidFill>
                 </a:rPr>
                 <a:t>Generate the data</a:t>
               </a:r>
-              <a:endParaRPr lang="en-GB" sz="2100" kern="1200" dirty="0" smtClean="0">
-                <a:solidFill>
-                  <a:schemeClr val="tx1"/>
-                </a:solidFill>
-              </a:endParaRPr>
             </a:p>
           </p:txBody>
         </p:sp>
@@ -15337,34 +15224,152 @@
                 </a:spcAft>
               </a:pPr>
               <a:r>
-                <a:rPr lang="en-GB" sz="2100" kern="1200" dirty="0" smtClean="0">
+                <a:rPr lang="en-GB" sz="2100" kern="1200" dirty="0">
                   <a:solidFill>
                     <a:schemeClr val="tx1"/>
                   </a:solidFill>
                 </a:rPr>
                 <a:t>Simplification</a:t>
               </a:r>
-              <a:endParaRPr lang="en-GB" sz="2100" kern="1200" dirty="0">
-                <a:solidFill>
-                  <a:schemeClr val="tx1"/>
-                </a:solidFill>
-              </a:endParaRPr>
             </a:p>
           </p:txBody>
         </p:sp>
       </p:grpSp>
+      <p:sp>
+        <p:nvSpPr>
+          <p:cNvPr id="32" name="ZoneTexte 31"/>
+          <p:cNvSpPr txBox="1"/>
+          <p:nvPr/>
+        </p:nvSpPr>
+        <p:spPr>
+          <a:xfrm>
+            <a:off x="1201978" y="2125974"/>
+            <a:ext cx="5046422" cy="2031325"/>
+          </a:xfrm>
+          <a:prstGeom prst="rect">
+            <a:avLst/>
+          </a:prstGeom>
+          <a:noFill/>
+        </p:spPr>
+        <p:txBody>
+          <a:bodyPr wrap="square" rtlCol="0">
+            <a:spAutoFit/>
+          </a:bodyPr>
+          <a:lstStyle/>
+          <a:p>
+            <a:pPr marL="285750" indent="-285750" algn="just">
+              <a:buFont typeface="Arial" panose="020B0604020202020204" pitchFamily="34" charset="0"/>
+              <a:buChar char="•"/>
+            </a:pPr>
+            <a:r>
+              <a:rPr lang="en-GB" dirty="0"/>
+              <a:t>Database</a:t>
+            </a:r>
+            <a:r>
+              <a:rPr lang="fr-FR" dirty="0"/>
+              <a:t> backup.</a:t>
+            </a:r>
+            <a:endParaRPr lang="en-GB" dirty="0"/>
+          </a:p>
+          <a:p>
+            <a:pPr marL="285750" indent="-285750" algn="just">
+              <a:buFont typeface="Arial" panose="020B0604020202020204" pitchFamily="34" charset="0"/>
+              <a:buChar char="•"/>
+            </a:pPr>
+            <a:r>
+              <a:rPr lang="en-GB" dirty="0"/>
+              <a:t>Add </a:t>
+            </a:r>
+            <a:r>
+              <a:rPr lang="en-GB" dirty="0" err="1"/>
+              <a:t>Eij</a:t>
+            </a:r>
+            <a:r>
+              <a:rPr lang="en-GB" dirty="0"/>
+              <a:t>, electrical energy coefficient for each road arc.</a:t>
+            </a:r>
+          </a:p>
+          <a:p>
+            <a:pPr marL="285750" indent="-285750" algn="just">
+              <a:buFont typeface="Arial" panose="020B0604020202020204" pitchFamily="34" charset="0"/>
+              <a:buChar char="•"/>
+            </a:pPr>
+            <a:r>
+              <a:rPr lang="fr-FR" dirty="0" err="1"/>
+              <a:t>Add</a:t>
+            </a:r>
+            <a:r>
+              <a:rPr lang="fr-FR" dirty="0"/>
+              <a:t> </a:t>
+            </a:r>
+            <a:r>
+              <a:rPr lang="fr-FR" dirty="0" err="1"/>
+              <a:t>Tij</a:t>
+            </a:r>
+            <a:r>
+              <a:rPr lang="fr-FR" dirty="0"/>
+              <a:t>, time coefficient for </a:t>
+            </a:r>
+            <a:r>
+              <a:rPr lang="fr-FR" dirty="0" err="1"/>
+              <a:t>each</a:t>
+            </a:r>
+            <a:r>
+              <a:rPr lang="fr-FR" dirty="0"/>
+              <a:t> road arc (</a:t>
+            </a:r>
+            <a:r>
+              <a:rPr lang="fr-FR" dirty="0" err="1"/>
+              <a:t>traffic</a:t>
+            </a:r>
+            <a:r>
+              <a:rPr lang="fr-FR" dirty="0"/>
+              <a:t>, speed…)</a:t>
+            </a:r>
+            <a:endParaRPr lang="en-GB" dirty="0"/>
+          </a:p>
+          <a:p>
+            <a:pPr marL="285750" indent="-285750" algn="just">
+              <a:buFont typeface="Arial" panose="020B0604020202020204" pitchFamily="34" charset="0"/>
+              <a:buChar char="•"/>
+            </a:pPr>
+            <a:r>
+              <a:rPr lang="en-GB" dirty="0"/>
+              <a:t>Add charge time at each station.</a:t>
+            </a:r>
+          </a:p>
+          <a:p>
+            <a:pPr marL="285750" indent="-285750" algn="just">
+              <a:buFont typeface="Arial" panose="020B0604020202020204" pitchFamily="34" charset="0"/>
+              <a:buChar char="•"/>
+            </a:pPr>
+            <a:r>
+              <a:rPr lang="en-GB" dirty="0"/>
+              <a:t>Update database</a:t>
+            </a:r>
+          </a:p>
+        </p:txBody>
+      </p:sp>
       <p:cxnSp>
         <p:nvCxnSpPr>
-          <p:cNvPr id="14" name="Connecteur droit avec flèche 13"/>
-          <p:cNvCxnSpPr/>
+          <p:cNvPr id="5" name="Connecteur : en arc 4">
+            <a:extLst>
+              <a:ext uri="{FF2B5EF4-FFF2-40B4-BE49-F238E27FC236}">
+                <a16:creationId xmlns:a16="http://schemas.microsoft.com/office/drawing/2014/main" id="{197F2EB6-8E31-4B3A-BA80-2A2AB2212A07}"/>
+              </a:ext>
+            </a:extLst>
+          </p:cNvPr>
+          <p:cNvCxnSpPr>
+            <a:cxnSpLocks/>
+          </p:cNvCxnSpPr>
           <p:nvPr/>
         </p:nvCxnSpPr>
         <p:spPr>
           <a:xfrm>
-            <a:off x="1853846" y="5487333"/>
-            <a:ext cx="3600000" cy="0"/>
+            <a:off x="1329495" y="4792080"/>
+            <a:ext cx="4922186" cy="1214825"/>
           </a:xfrm>
-          <a:prstGeom prst="straightConnector1">
+          <a:prstGeom prst="curvedConnector3">
             <a:avLst/>
           </a:prstGeom>
           <a:ln>
@@ -15389,14 +15394,20 @@
       </p:cxnSp>
       <p:sp>
         <p:nvSpPr>
-          <p:cNvPr id="32" name="ZoneTexte 31"/>
+          <p:cNvPr id="10" name="ZoneTexte 9">
+            <a:extLst>
+              <a:ext uri="{FF2B5EF4-FFF2-40B4-BE49-F238E27FC236}">
+                <a16:creationId xmlns:a16="http://schemas.microsoft.com/office/drawing/2014/main" id="{F1C55BCD-2FE3-43D5-879A-8C589E830D03}"/>
+              </a:ext>
+            </a:extLst>
+          </p:cNvPr>
           <p:cNvSpPr txBox="1"/>
           <p:nvPr/>
         </p:nvSpPr>
         <p:spPr>
           <a:xfrm>
-            <a:off x="1201978" y="2125974"/>
-            <a:ext cx="5046422" cy="2031325"/>
+            <a:off x="2641007" y="5162843"/>
+            <a:ext cx="819425" cy="369332"/>
           </a:xfrm>
           <a:prstGeom prst="rect">
             <a:avLst/>
@@ -15409,118 +15420,30 @@
           </a:bodyPr>
           <a:lstStyle/>
           <a:p>
-            <a:pPr marL="285750" indent="-285750">
-              <a:buFont typeface="Arial" panose="020B0604020202020204" pitchFamily="34" charset="0"/>
-              <a:buChar char="•"/>
-            </a:pPr>
-            <a:r>
-              <a:rPr lang="en-GB" dirty="0" smtClean="0"/>
-              <a:t>Database</a:t>
-            </a:r>
-            <a:r>
-              <a:rPr lang="fr-FR" dirty="0" smtClean="0"/>
-              <a:t> backup.</a:t>
-            </a:r>
-            <a:endParaRPr lang="en-GB" dirty="0" smtClean="0"/>
-          </a:p>
-          <a:p>
-            <a:pPr marL="285750" indent="-285750">
-              <a:buFont typeface="Arial" panose="020B0604020202020204" pitchFamily="34" charset="0"/>
-              <a:buChar char="•"/>
-            </a:pPr>
-            <a:r>
-              <a:rPr lang="en-GB" dirty="0" smtClean="0"/>
-              <a:t>Add </a:t>
-            </a:r>
-            <a:r>
-              <a:rPr lang="en-GB" dirty="0" err="1" smtClean="0"/>
-              <a:t>Eij</a:t>
-            </a:r>
-            <a:r>
-              <a:rPr lang="en-GB" dirty="0" smtClean="0"/>
-              <a:t>, </a:t>
-            </a:r>
-            <a:r>
-              <a:rPr lang="en-GB" dirty="0" smtClean="0"/>
-              <a:t>electrical energy coefficient for each road arc.</a:t>
-            </a:r>
-          </a:p>
-          <a:p>
-            <a:pPr marL="285750" indent="-285750">
-              <a:buFont typeface="Arial" panose="020B0604020202020204" pitchFamily="34" charset="0"/>
-              <a:buChar char="•"/>
-            </a:pPr>
-            <a:r>
-              <a:rPr lang="fr-FR" dirty="0" err="1" smtClean="0"/>
-              <a:t>Add</a:t>
-            </a:r>
-            <a:r>
-              <a:rPr lang="fr-FR" dirty="0" smtClean="0"/>
-              <a:t> </a:t>
-            </a:r>
-            <a:r>
-              <a:rPr lang="fr-FR" dirty="0" err="1" smtClean="0"/>
+            <a:r>
+              <a:rPr lang="fr-FR" dirty="0" err="1"/>
               <a:t>Tij</a:t>
             </a:r>
-            <a:r>
-              <a:rPr lang="fr-FR" dirty="0" smtClean="0"/>
-              <a:t>, time coefficient for </a:t>
-            </a:r>
-            <a:r>
-              <a:rPr lang="fr-FR" dirty="0" err="1" smtClean="0"/>
-              <a:t>each</a:t>
-            </a:r>
-            <a:r>
-              <a:rPr lang="fr-FR" dirty="0" smtClean="0"/>
-              <a:t> road arc (</a:t>
-            </a:r>
-            <a:r>
-              <a:rPr lang="fr-FR" dirty="0" err="1" smtClean="0"/>
-              <a:t>traffic</a:t>
-            </a:r>
-            <a:r>
-              <a:rPr lang="fr-FR" dirty="0" smtClean="0"/>
-              <a:t>, speed…)</a:t>
-            </a:r>
-            <a:endParaRPr lang="en-GB" dirty="0" smtClean="0"/>
-          </a:p>
-          <a:p>
-            <a:pPr marL="285750" indent="-285750">
-              <a:buFont typeface="Arial" panose="020B0604020202020204" pitchFamily="34" charset="0"/>
-              <a:buChar char="•"/>
-            </a:pPr>
-            <a:r>
-              <a:rPr lang="en-GB" dirty="0" smtClean="0"/>
-              <a:t>Add c</a:t>
-            </a:r>
-            <a:r>
-              <a:rPr lang="en-GB" dirty="0" smtClean="0"/>
-              <a:t>harge time at each station.</a:t>
-            </a:r>
-          </a:p>
-          <a:p>
-            <a:pPr marL="285750" indent="-285750">
-              <a:buFont typeface="Arial" panose="020B0604020202020204" pitchFamily="34" charset="0"/>
-              <a:buChar char="•"/>
-            </a:pPr>
-            <a:r>
-              <a:rPr lang="en-GB" dirty="0" smtClean="0"/>
-              <a:t>Update database</a:t>
-            </a:r>
-            <a:endParaRPr lang="en-GB" dirty="0"/>
-          </a:p>
-        </p:txBody>
-      </p:sp>
-      <p:sp>
-        <p:nvSpPr>
-          <p:cNvPr id="2" name="ZoneTexte 1"/>
+            <a:endParaRPr lang="fr-FR" dirty="0"/>
+          </a:p>
+        </p:txBody>
+      </p:sp>
+      <p:sp>
+        <p:nvSpPr>
+          <p:cNvPr id="20" name="ZoneTexte 19">
+            <a:extLst>
+              <a:ext uri="{FF2B5EF4-FFF2-40B4-BE49-F238E27FC236}">
+                <a16:creationId xmlns:a16="http://schemas.microsoft.com/office/drawing/2014/main" id="{6C86E5B7-F6DE-451E-8A4E-7EAD6F7A6DEB}"/>
+              </a:ext>
+            </a:extLst>
+          </p:cNvPr>
           <p:cNvSpPr txBox="1"/>
           <p:nvPr/>
         </p:nvSpPr>
         <p:spPr>
           <a:xfrm>
-            <a:off x="3406534" y="4932218"/>
-            <a:ext cx="637309" cy="369332"/>
+            <a:off x="4279859" y="5214826"/>
+            <a:ext cx="819425" cy="369332"/>
           </a:xfrm>
           <a:prstGeom prst="rect">
             <a:avLst/>
@@ -15534,40 +15457,10 @@
           <a:lstStyle/>
           <a:p>
             <a:r>
-              <a:rPr lang="fr-FR" dirty="0" err="1" smtClean="0"/>
-              <a:t>Tij</a:t>
-            </a:r>
-            <a:endParaRPr lang="en-GB" dirty="0"/>
-          </a:p>
-        </p:txBody>
-      </p:sp>
-      <p:sp>
-        <p:nvSpPr>
-          <p:cNvPr id="15" name="ZoneTexte 14"/>
-          <p:cNvSpPr txBox="1"/>
-          <p:nvPr/>
-        </p:nvSpPr>
-        <p:spPr>
-          <a:xfrm>
-            <a:off x="3406533" y="5673117"/>
-            <a:ext cx="637309" cy="369332"/>
-          </a:xfrm>
-          <a:prstGeom prst="rect">
-            <a:avLst/>
-          </a:prstGeom>
-          <a:noFill/>
-        </p:spPr>
-        <p:txBody>
-          <a:bodyPr wrap="square" rtlCol="0">
-            <a:spAutoFit/>
-          </a:bodyPr>
-          <a:lstStyle/>
-          <a:p>
-            <a:r>
-              <a:rPr lang="fr-FR" dirty="0" err="1" smtClean="0"/>
+              <a:rPr lang="fr-FR" dirty="0" err="1"/>
               <a:t>Eij</a:t>
             </a:r>
-            <a:endParaRPr lang="en-GB" dirty="0"/>
+            <a:endParaRPr lang="fr-FR" dirty="0"/>
           </a:p>
         </p:txBody>
       </p:sp>
@@ -15581,13 +15474,6 @@
   <p:clrMapOvr>
     <a:masterClrMapping/>
   </p:clrMapOvr>
-  <p:timing>
-    <p:tnLst>
-      <p:par>
-        <p:cTn id="1" dur="indefinite" restart="never" nodeType="tmRoot"/>
-      </p:par>
-    </p:tnLst>
-  </p:timing>
 </p:sld>
 </file>
 

</xml_diff>